<commit_message>
code commited for the PPT.
</commit_message>
<xml_diff>
--- a/ppt/java/interview-questions/spring interview/1-dependecy-injection/dependecy-injection.pptx
+++ b/ppt/java/interview-questions/spring interview/1-dependecy-injection/dependecy-injection.pptx
@@ -2,7 +2,7 @@
 <file path=ppt/presentation.xml><?xml version="1.0" encoding="utf-8"?>
 <p:presentation xmlns:a="http://schemas.openxmlformats.org/drawingml/2006/main" xmlns:r="http://schemas.openxmlformats.org/officeDocument/2006/relationships" xmlns:p="http://schemas.openxmlformats.org/presentationml/2006/main" saveSubsetFonts="1" autoCompressPictures="0">
   <p:sldMasterIdLst>
-    <p:sldMasterId id="2147483660" r:id="rId1"/>
+    <p:sldMasterId id="2147483678" r:id="rId1"/>
   </p:sldMasterIdLst>
   <p:notesMasterIdLst>
     <p:notesMasterId r:id="rId12"/>
@@ -19,7 +19,7 @@
     <p:sldId id="264" r:id="rId10"/>
     <p:sldId id="265" r:id="rId11"/>
   </p:sldIdLst>
-  <p:sldSz cx="9144000" cy="6858000" type="screen4x3"/>
+  <p:sldSz cx="9144000" cy="5143500" type="screen16x9"/>
   <p:notesSz cx="6858000" cy="9144000"/>
   <p:defaultTextStyle>
     <a:defPPr>
@@ -119,12 +119,12 @@
   <p:extLst>
     <p:ext uri="{EFAFB233-063F-42B5-8137-9DF3F51BA10A}">
       <p15:sldGuideLst xmlns:p15="http://schemas.microsoft.com/office/powerpoint/2012/main">
-        <p15:guide id="1" orient="horz" pos="2160">
+        <p15:guide id="1" orient="horz" pos="1620" userDrawn="1">
           <p15:clr>
             <a:srgbClr val="A4A3A4"/>
           </p15:clr>
         </p15:guide>
-        <p15:guide id="2" pos="2880">
+        <p15:guide id="2" pos="2880" userDrawn="1">
           <p15:clr>
             <a:srgbClr val="A4A3A4"/>
           </p15:clr>
@@ -217,7 +217,7 @@
           <a:p>
             <a:fld id="{2880FD88-0BB9-434D-9292-9AAEA360259C}" type="datetimeFigureOut">
               <a:rPr lang="en-US" smtClean="0"/>
-              <a:t>4/4/2025</a:t>
+              <a:t>4/5/2025</a:t>
             </a:fld>
             <a:endParaRPr lang="en-US"/>
           </a:p>
@@ -235,8 +235,8 @@
         </p:nvSpPr>
         <p:spPr>
           <a:xfrm>
-            <a:off x="1371600" y="1143000"/>
-            <a:ext cx="4114800" cy="3086100"/>
+            <a:off x="685800" y="1143000"/>
+            <a:ext cx="5486400" cy="3086100"/>
           </a:xfrm>
           <a:prstGeom prst="rect">
             <a:avLst/>
@@ -511,7 +511,12 @@
             <p:ph type="sldImg"/>
           </p:nvPr>
         </p:nvSpPr>
-        <p:spPr/>
+        <p:spPr>
+          <a:xfrm>
+            <a:off x="685800" y="1143000"/>
+            <a:ext cx="5486400" cy="3086100"/>
+          </a:xfrm>
+        </p:spPr>
       </p:sp>
       <p:sp>
         <p:nvSpPr>
@@ -1625,7 +1630,12 @@
             <p:ph type="sldImg"/>
           </p:nvPr>
         </p:nvSpPr>
-        <p:spPr/>
+        <p:spPr>
+          <a:xfrm>
+            <a:off x="685800" y="1143000"/>
+            <a:ext cx="5486400" cy="3086100"/>
+          </a:xfrm>
+        </p:spPr>
       </p:sp>
       <p:sp>
         <p:nvSpPr>
@@ -1847,7 +1857,12 @@
             <p:ph type="sldImg"/>
           </p:nvPr>
         </p:nvSpPr>
-        <p:spPr/>
+        <p:spPr>
+          <a:xfrm>
+            <a:off x="685800" y="1143000"/>
+            <a:ext cx="5486400" cy="3086100"/>
+          </a:xfrm>
+        </p:spPr>
       </p:sp>
       <p:sp>
         <p:nvSpPr>
@@ -1923,21 +1938,21 @@
       </p:grpSpPr>
       <p:grpSp>
         <p:nvGrpSpPr>
-          <p:cNvPr id="18" name="Group 17"/>
+          <p:cNvPr id="7" name="Group 6"/>
           <p:cNvGrpSpPr/>
           <p:nvPr/>
         </p:nvGrpSpPr>
         <p:grpSpPr>
           <a:xfrm>
-            <a:off x="0" y="0"/>
-            <a:ext cx="9144677" cy="6858000"/>
-            <a:chOff x="0" y="0"/>
-            <a:chExt cx="9144677" cy="6858000"/>
+            <a:off x="-12700" y="0"/>
+            <a:ext cx="9173370" cy="5142161"/>
+            <a:chOff x="-16934" y="0"/>
+            <a:chExt cx="12231160" cy="6856214"/>
           </a:xfrm>
         </p:grpSpPr>
         <p:pic>
           <p:nvPicPr>
-            <p:cNvPr id="8" name="Picture 7" descr="SD-PanelTitle-R1.png"/>
+            <p:cNvPr id="16" name="Picture 15" descr="HD-PanelTitleR1.png"/>
             <p:cNvPicPr>
               <a:picLocks noChangeAspect="1"/>
             </p:cNvPicPr>
@@ -1958,7 +1973,7 @@
           <p:spPr>
             <a:xfrm>
               <a:off x="0" y="0"/>
-              <a:ext cx="9144000" cy="6858000"/>
+              <a:ext cx="12188825" cy="6856214"/>
             </a:xfrm>
             <a:prstGeom prst="rect">
               <a:avLst/>
@@ -1967,20 +1982,20 @@
         </p:pic>
         <p:sp>
           <p:nvSpPr>
-            <p:cNvPr id="11" name="Rectangle 10"/>
+            <p:cNvPr id="26" name="Rectangle 25"/>
             <p:cNvSpPr/>
             <p:nvPr/>
           </p:nvSpPr>
           <p:spPr>
             <a:xfrm>
-              <a:off x="1515532" y="1520422"/>
-              <a:ext cx="6112935" cy="3818468"/>
+              <a:off x="2328332" y="1540931"/>
+              <a:ext cx="7543802" cy="3835401"/>
             </a:xfrm>
             <a:prstGeom prst="rect">
               <a:avLst/>
             </a:prstGeom>
             <a:noFill/>
-            <a:ln w="15875" cap="flat">
+            <a:ln w="15875">
               <a:miter lim="800000"/>
             </a:ln>
           </p:spPr>
@@ -2001,7 +2016,7 @@
         </p:sp>
         <p:pic>
           <p:nvPicPr>
-            <p:cNvPr id="12" name="Picture 11" descr="HDRibbonTitle-UniformTrim.png"/>
+            <p:cNvPr id="17" name="Picture 16" descr="HDRibbonTitle-UniformTrim.png"/>
             <p:cNvPicPr>
               <a:picLocks noChangeAspect="1"/>
             </p:cNvPicPr>
@@ -2015,13 +2030,13 @@
                 </a:ext>
               </a:extLst>
             </a:blip>
-            <a:srcRect l="-2" r="47959"/>
+            <a:srcRect/>
             <a:stretch/>
           </p:blipFill>
           <p:spPr>
             <a:xfrm>
-              <a:off x="0" y="3128434"/>
-              <a:ext cx="1664208" cy="612648"/>
+              <a:off x="-16934" y="3147609"/>
+              <a:ext cx="2478024" cy="612648"/>
             </a:xfrm>
             <a:prstGeom prst="rect">
               <a:avLst/>
@@ -2030,7 +2045,7 @@
         </p:pic>
         <p:pic>
           <p:nvPicPr>
-            <p:cNvPr id="13" name="Picture 12" descr="HDRibbonTitle-UniformTrim.png"/>
+            <p:cNvPr id="20" name="Picture 19" descr="HDRibbonTitle-UniformTrim.png"/>
             <p:cNvPicPr>
               <a:picLocks noChangeAspect="1"/>
             </p:cNvPicPr>
@@ -2044,13 +2059,13 @@
                 </a:ext>
               </a:extLst>
             </a:blip>
-            <a:srcRect l="-2" r="47959"/>
+            <a:srcRect/>
             <a:stretch/>
           </p:blipFill>
           <p:spPr>
             <a:xfrm>
-              <a:off x="7480469" y="3128434"/>
-              <a:ext cx="1664208" cy="612648"/>
+              <a:off x="9736202" y="3147609"/>
+              <a:ext cx="2478024" cy="612648"/>
             </a:xfrm>
             <a:prstGeom prst="rect">
               <a:avLst/>
@@ -2070,8 +2085,8 @@
         </p:nvSpPr>
         <p:spPr>
           <a:xfrm>
-            <a:off x="1921934" y="1811863"/>
-            <a:ext cx="5308866" cy="1515533"/>
+            <a:off x="2019299" y="1403349"/>
+            <a:ext cx="5111752" cy="1136650"/>
           </a:xfrm>
         </p:spPr>
         <p:txBody>
@@ -2080,7 +2095,7 @@
           </a:bodyPr>
           <a:lstStyle>
             <a:lvl1pPr algn="ctr">
-              <a:defRPr sz="4800">
+              <a:defRPr sz="4050">
                 <a:effectLst/>
               </a:defRPr>
             </a:lvl1pPr>
@@ -2106,8 +2121,8 @@
         </p:nvSpPr>
         <p:spPr>
           <a:xfrm>
-            <a:off x="1921934" y="3598327"/>
-            <a:ext cx="5308866" cy="1377651"/>
+            <a:off x="2019299" y="2743198"/>
+            <a:ext cx="5111752" cy="990602"/>
           </a:xfrm>
         </p:spPr>
         <p:txBody>
@@ -2117,13 +2132,13 @@
           <a:lstStyle>
             <a:lvl1pPr marL="0" indent="0" algn="ctr">
               <a:buNone/>
-              <a:defRPr sz="2000">
+              <a:defRPr sz="1575">
                 <a:solidFill>
                   <a:schemeClr val="tx1"/>
                 </a:solidFill>
               </a:defRPr>
             </a:lvl1pPr>
-            <a:lvl2pPr marL="457200" indent="0" algn="ctr">
+            <a:lvl2pPr marL="342900" indent="0" algn="ctr">
               <a:buNone/>
               <a:defRPr>
                 <a:solidFill>
@@ -2133,7 +2148,7 @@
                 </a:solidFill>
               </a:defRPr>
             </a:lvl2pPr>
-            <a:lvl3pPr marL="914400" indent="0" algn="ctr">
+            <a:lvl3pPr marL="685800" indent="0" algn="ctr">
               <a:buNone/>
               <a:defRPr>
                 <a:solidFill>
@@ -2143,7 +2158,7 @@
                 </a:solidFill>
               </a:defRPr>
             </a:lvl3pPr>
-            <a:lvl4pPr marL="1371600" indent="0" algn="ctr">
+            <a:lvl4pPr marL="1028700" indent="0" algn="ctr">
               <a:buNone/>
               <a:defRPr>
                 <a:solidFill>
@@ -2153,7 +2168,7 @@
                 </a:solidFill>
               </a:defRPr>
             </a:lvl4pPr>
-            <a:lvl5pPr marL="1828800" indent="0" algn="ctr">
+            <a:lvl5pPr marL="1371600" indent="0" algn="ctr">
               <a:buNone/>
               <a:defRPr>
                 <a:solidFill>
@@ -2163,7 +2178,7 @@
                 </a:solidFill>
               </a:defRPr>
             </a:lvl5pPr>
-            <a:lvl6pPr marL="2286000" indent="0" algn="ctr">
+            <a:lvl6pPr marL="1714500" indent="0" algn="ctr">
               <a:buNone/>
               <a:defRPr>
                 <a:solidFill>
@@ -2173,7 +2188,7 @@
                 </a:solidFill>
               </a:defRPr>
             </a:lvl6pPr>
-            <a:lvl7pPr marL="2743200" indent="0" algn="ctr">
+            <a:lvl7pPr marL="2057400" indent="0" algn="ctr">
               <a:buNone/>
               <a:defRPr>
                 <a:solidFill>
@@ -2183,7 +2198,7 @@
                 </a:solidFill>
               </a:defRPr>
             </a:lvl7pPr>
-            <a:lvl8pPr marL="3200400" indent="0" algn="ctr">
+            <a:lvl8pPr marL="2400300" indent="0" algn="ctr">
               <a:buNone/>
               <a:defRPr>
                 <a:solidFill>
@@ -2193,7 +2208,7 @@
                 </a:solidFill>
               </a:defRPr>
             </a:lvl8pPr>
-            <a:lvl9pPr marL="3657600" indent="0" algn="ctr">
+            <a:lvl9pPr marL="2743200" indent="0" algn="ctr">
               <a:buNone/>
               <a:defRPr>
                 <a:solidFill>
@@ -2225,8 +2240,8 @@
         </p:nvSpPr>
         <p:spPr>
           <a:xfrm>
-            <a:off x="6065417" y="5054602"/>
-            <a:ext cx="673276" cy="279400"/>
+            <a:off x="5987425" y="3778247"/>
+            <a:ext cx="673100" cy="209550"/>
           </a:xfrm>
         </p:spPr>
         <p:txBody>
@@ -2235,7 +2250,7 @@
           <a:p>
             <a:fld id="{5BCAD085-E8A6-8845-BD4E-CB4CCA059FC4}" type="datetimeFigureOut">
               <a:rPr lang="en-US" smtClean="0"/>
-              <a:t>4/4/2025</a:t>
+              <a:t>4/5/2025</a:t>
             </a:fld>
             <a:endParaRPr lang="en-US"/>
           </a:p>
@@ -2253,8 +2268,8 @@
         </p:nvSpPr>
         <p:spPr>
           <a:xfrm>
-            <a:off x="1921934" y="5054602"/>
-            <a:ext cx="4064860" cy="279400"/>
+            <a:off x="2019298" y="3778247"/>
+            <a:ext cx="3910976" cy="209550"/>
           </a:xfrm>
         </p:spPr>
         <p:txBody>
@@ -2277,8 +2292,8 @@
         </p:nvSpPr>
         <p:spPr>
           <a:xfrm>
-            <a:off x="6817317" y="5054602"/>
-            <a:ext cx="413483" cy="279400"/>
+            <a:off x="6717676" y="3778247"/>
+            <a:ext cx="413375" cy="209550"/>
           </a:xfrm>
         </p:spPr>
         <p:txBody>
@@ -2301,13 +2316,12 @@
         </p:nvCxnSpPr>
         <p:spPr>
           <a:xfrm>
-            <a:off x="2019825" y="3471329"/>
-            <a:ext cx="5113083" cy="0"/>
+            <a:off x="2019299" y="2641598"/>
+            <a:ext cx="5111751" cy="0"/>
           </a:xfrm>
           <a:prstGeom prst="line">
             <a:avLst/>
           </a:prstGeom>
-          <a:ln w="15875"/>
         </p:spPr>
         <p:style>
           <a:lnRef idx="2">
@@ -2327,7 +2341,7 @@
     </p:spTree>
     <p:extLst>
       <p:ext uri="{BB962C8B-B14F-4D97-AF65-F5344CB8AC3E}">
-        <p14:creationId xmlns:p14="http://schemas.microsoft.com/office/powerpoint/2010/main" val="3135259992"/>
+        <p14:creationId xmlns:p14="http://schemas.microsoft.com/office/powerpoint/2010/main" val="3691484924"/>
       </p:ext>
     </p:extLst>
   </p:cSld>
@@ -2366,8 +2380,8 @@
         </p:nvSpPr>
         <p:spPr>
           <a:xfrm>
-            <a:off x="1176866" y="4815415"/>
-            <a:ext cx="6798734" cy="566738"/>
+            <a:off x="971551" y="3611561"/>
+            <a:ext cx="7207250" cy="425054"/>
           </a:xfrm>
         </p:spPr>
         <p:txBody>
@@ -2376,7 +2390,7 @@
           </a:bodyPr>
           <a:lstStyle>
             <a:lvl1pPr algn="ctr">
-              <a:defRPr sz="2400" b="0"/>
+              <a:defRPr sz="1800" b="0"/>
             </a:lvl1pPr>
           </a:lstStyle>
           <a:p>
@@ -2400,8 +2414,8 @@
         </p:nvSpPr>
         <p:spPr>
           <a:xfrm>
-            <a:off x="1026260" y="1032933"/>
-            <a:ext cx="7091482" cy="3361269"/>
+            <a:off x="781070" y="781050"/>
+            <a:ext cx="7579479" cy="2501902"/>
           </a:xfrm>
           <a:prstGeom prst="roundRect">
             <a:avLst>
@@ -2415,6 +2429,7 @@
                 <a:lumOff val="50000"/>
               </a:schemeClr>
             </a:solidFill>
+            <a:miter lim="800000"/>
           </a:ln>
           <a:effectLst>
             <a:innerShdw blurRad="57150" dist="38100" dir="14460000">
@@ -2431,39 +2446,39 @@
           <a:lstStyle>
             <a:lvl1pPr marL="0" indent="0" algn="ctr">
               <a:buNone/>
-              <a:defRPr sz="1600"/>
+              <a:defRPr sz="1200"/>
             </a:lvl1pPr>
-            <a:lvl2pPr marL="457200" indent="0">
-              <a:buNone/>
-              <a:defRPr sz="1600"/>
+            <a:lvl2pPr marL="342900" indent="0">
+              <a:buNone/>
+              <a:defRPr sz="1200"/>
             </a:lvl2pPr>
-            <a:lvl3pPr marL="914400" indent="0">
-              <a:buNone/>
-              <a:defRPr sz="1600"/>
+            <a:lvl3pPr marL="685800" indent="0">
+              <a:buNone/>
+              <a:defRPr sz="1200"/>
             </a:lvl3pPr>
-            <a:lvl4pPr marL="1371600" indent="0">
-              <a:buNone/>
-              <a:defRPr sz="1600"/>
+            <a:lvl4pPr marL="1028700" indent="0">
+              <a:buNone/>
+              <a:defRPr sz="1200"/>
             </a:lvl4pPr>
-            <a:lvl5pPr marL="1828800" indent="0">
-              <a:buNone/>
-              <a:defRPr sz="1600"/>
+            <a:lvl5pPr marL="1371600" indent="0">
+              <a:buNone/>
+              <a:defRPr sz="1200"/>
             </a:lvl5pPr>
-            <a:lvl6pPr marL="2286000" indent="0">
-              <a:buNone/>
-              <a:defRPr sz="1600"/>
+            <a:lvl6pPr marL="1714500" indent="0">
+              <a:buNone/>
+              <a:defRPr sz="1200"/>
             </a:lvl6pPr>
-            <a:lvl7pPr marL="2743200" indent="0">
-              <a:buNone/>
-              <a:defRPr sz="1600"/>
+            <a:lvl7pPr marL="2057400" indent="0">
+              <a:buNone/>
+              <a:defRPr sz="1200"/>
             </a:lvl7pPr>
-            <a:lvl8pPr marL="3200400" indent="0">
-              <a:buNone/>
-              <a:defRPr sz="1600"/>
+            <a:lvl8pPr marL="2400300" indent="0">
+              <a:buNone/>
+              <a:defRPr sz="1200"/>
             </a:lvl8pPr>
-            <a:lvl9pPr marL="3657600" indent="0">
-              <a:buNone/>
-              <a:defRPr sz="1600"/>
+            <a:lvl9pPr marL="2743200" indent="0">
+              <a:buNone/>
+              <a:defRPr sz="1200"/>
             </a:lvl9pPr>
           </a:lstStyle>
           <a:p>
@@ -2487,50 +2502,50 @@
         </p:nvSpPr>
         <p:spPr>
           <a:xfrm>
-            <a:off x="1176866" y="5382153"/>
-            <a:ext cx="6798734" cy="493712"/>
+            <a:off x="971551" y="4036615"/>
+            <a:ext cx="7207250" cy="370284"/>
           </a:xfrm>
         </p:spPr>
         <p:txBody>
-          <a:bodyPr anchor="t">
+          <a:bodyPr>
             <a:normAutofit/>
           </a:bodyPr>
           <a:lstStyle>
             <a:lvl1pPr marL="0" indent="0" algn="ctr">
               <a:buNone/>
-              <a:defRPr sz="1600"/>
+              <a:defRPr sz="1050"/>
             </a:lvl1pPr>
-            <a:lvl2pPr marL="457200" indent="0">
-              <a:buNone/>
-              <a:defRPr sz="1200"/>
+            <a:lvl2pPr marL="342900" indent="0">
+              <a:buNone/>
+              <a:defRPr sz="900"/>
             </a:lvl2pPr>
-            <a:lvl3pPr marL="914400" indent="0">
-              <a:buNone/>
-              <a:defRPr sz="1000"/>
+            <a:lvl3pPr marL="685800" indent="0">
+              <a:buNone/>
+              <a:defRPr sz="750"/>
             </a:lvl3pPr>
-            <a:lvl4pPr marL="1371600" indent="0">
-              <a:buNone/>
-              <a:defRPr sz="900"/>
+            <a:lvl4pPr marL="1028700" indent="0">
+              <a:buNone/>
+              <a:defRPr sz="675"/>
             </a:lvl4pPr>
-            <a:lvl5pPr marL="1828800" indent="0">
-              <a:buNone/>
-              <a:defRPr sz="900"/>
+            <a:lvl5pPr marL="1371600" indent="0">
+              <a:buNone/>
+              <a:defRPr sz="675"/>
             </a:lvl5pPr>
-            <a:lvl6pPr marL="2286000" indent="0">
-              <a:buNone/>
-              <a:defRPr sz="900"/>
+            <a:lvl6pPr marL="1714500" indent="0">
+              <a:buNone/>
+              <a:defRPr sz="675"/>
             </a:lvl6pPr>
-            <a:lvl7pPr marL="2743200" indent="0">
-              <a:buNone/>
-              <a:defRPr sz="900"/>
+            <a:lvl7pPr marL="2057400" indent="0">
+              <a:buNone/>
+              <a:defRPr sz="675"/>
             </a:lvl7pPr>
-            <a:lvl8pPr marL="3200400" indent="0">
-              <a:buNone/>
-              <a:defRPr sz="900"/>
+            <a:lvl8pPr marL="2400300" indent="0">
+              <a:buNone/>
+              <a:defRPr sz="675"/>
             </a:lvl8pPr>
-            <a:lvl9pPr marL="3657600" indent="0">
-              <a:buNone/>
-              <a:defRPr sz="900"/>
+            <a:lvl9pPr marL="2743200" indent="0">
+              <a:buNone/>
+              <a:defRPr sz="675"/>
             </a:lvl9pPr>
           </a:lstStyle>
           <a:p>
@@ -2559,7 +2574,7 @@
           <a:p>
             <a:fld id="{5BCAD085-E8A6-8845-BD4E-CB4CCA059FC4}" type="datetimeFigureOut">
               <a:rPr lang="en-US" smtClean="0"/>
-              <a:t>4/4/2025</a:t>
+              <a:t>4/5/2025</a:t>
             </a:fld>
             <a:endParaRPr lang="en-US"/>
           </a:p>
@@ -2610,7 +2625,7 @@
     </p:spTree>
     <p:extLst>
       <p:ext uri="{BB962C8B-B14F-4D97-AF65-F5344CB8AC3E}">
-        <p14:creationId xmlns:p14="http://schemas.microsoft.com/office/powerpoint/2010/main" val="269542432"/>
+        <p14:creationId xmlns:p14="http://schemas.microsoft.com/office/powerpoint/2010/main" val="2976022836"/>
       </p:ext>
     </p:extLst>
   </p:cSld>
@@ -2649,8 +2664,8 @@
         </p:nvSpPr>
         <p:spPr>
           <a:xfrm>
-            <a:off x="1176866" y="906873"/>
-            <a:ext cx="6798734" cy="3097860"/>
+            <a:off x="977901" y="736599"/>
+            <a:ext cx="7194549" cy="2216151"/>
           </a:xfrm>
         </p:spPr>
         <p:txBody>
@@ -2659,7 +2674,7 @@
           </a:bodyPr>
           <a:lstStyle>
             <a:lvl1pPr algn="ctr">
-              <a:defRPr sz="3200" b="0" cap="none"/>
+              <a:defRPr sz="2400" b="0" cap="none"/>
             </a:lvl1pPr>
           </a:lstStyle>
           <a:p>
@@ -2683,8 +2698,8 @@
         </p:nvSpPr>
         <p:spPr>
           <a:xfrm>
-            <a:off x="1176865" y="4275666"/>
-            <a:ext cx="6798736" cy="1600202"/>
+            <a:off x="977901" y="3257550"/>
+            <a:ext cx="7194549" cy="1149350"/>
           </a:xfrm>
         </p:spPr>
         <p:txBody>
@@ -2694,15 +2709,15 @@
           <a:lstStyle>
             <a:lvl1pPr marL="0" indent="0" algn="ctr">
               <a:buNone/>
-              <a:defRPr sz="2000">
+              <a:defRPr sz="1500">
                 <a:solidFill>
                   <a:schemeClr val="tx1"/>
                 </a:solidFill>
               </a:defRPr>
             </a:lvl1pPr>
-            <a:lvl2pPr marL="457200" indent="0">
-              <a:buNone/>
-              <a:defRPr sz="1800">
+            <a:lvl2pPr marL="342900" indent="0">
+              <a:buNone/>
+              <a:defRPr sz="1350">
                 <a:solidFill>
                   <a:schemeClr val="tx1">
                     <a:tint val="75000"/>
@@ -2710,9 +2725,9 @@
                 </a:solidFill>
               </a:defRPr>
             </a:lvl2pPr>
-            <a:lvl3pPr marL="914400" indent="0">
-              <a:buNone/>
-              <a:defRPr sz="1600">
+            <a:lvl3pPr marL="685800" indent="0">
+              <a:buNone/>
+              <a:defRPr sz="1200">
                 <a:solidFill>
                   <a:schemeClr val="tx1">
                     <a:tint val="75000"/>
@@ -2720,9 +2735,9 @@
                 </a:solidFill>
               </a:defRPr>
             </a:lvl3pPr>
-            <a:lvl4pPr marL="1371600" indent="0">
-              <a:buNone/>
-              <a:defRPr sz="1400">
+            <a:lvl4pPr marL="1028700" indent="0">
+              <a:buNone/>
+              <a:defRPr sz="1050">
                 <a:solidFill>
                   <a:schemeClr val="tx1">
                     <a:tint val="75000"/>
@@ -2730,9 +2745,9 @@
                 </a:solidFill>
               </a:defRPr>
             </a:lvl4pPr>
-            <a:lvl5pPr marL="1828800" indent="0">
-              <a:buNone/>
-              <a:defRPr sz="1400">
+            <a:lvl5pPr marL="1371600" indent="0">
+              <a:buNone/>
+              <a:defRPr sz="1050">
                 <a:solidFill>
                   <a:schemeClr val="tx1">
                     <a:tint val="75000"/>
@@ -2740,9 +2755,9 @@
                 </a:solidFill>
               </a:defRPr>
             </a:lvl5pPr>
-            <a:lvl6pPr marL="2286000" indent="0">
-              <a:buNone/>
-              <a:defRPr sz="1400">
+            <a:lvl6pPr marL="1714500" indent="0">
+              <a:buNone/>
+              <a:defRPr sz="1050">
                 <a:solidFill>
                   <a:schemeClr val="tx1">
                     <a:tint val="75000"/>
@@ -2750,9 +2765,9 @@
                 </a:solidFill>
               </a:defRPr>
             </a:lvl6pPr>
-            <a:lvl7pPr marL="2743200" indent="0">
-              <a:buNone/>
-              <a:defRPr sz="1400">
+            <a:lvl7pPr marL="2057400" indent="0">
+              <a:buNone/>
+              <a:defRPr sz="1050">
                 <a:solidFill>
                   <a:schemeClr val="tx1">
                     <a:tint val="75000"/>
@@ -2760,9 +2775,9 @@
                 </a:solidFill>
               </a:defRPr>
             </a:lvl7pPr>
-            <a:lvl8pPr marL="3200400" indent="0">
-              <a:buNone/>
-              <a:defRPr sz="1400">
+            <a:lvl8pPr marL="2400300" indent="0">
+              <a:buNone/>
+              <a:defRPr sz="1050">
                 <a:solidFill>
                   <a:schemeClr val="tx1">
                     <a:tint val="75000"/>
@@ -2770,9 +2785,9 @@
                 </a:solidFill>
               </a:defRPr>
             </a:lvl8pPr>
-            <a:lvl9pPr marL="3657600" indent="0">
-              <a:buNone/>
-              <a:defRPr sz="1400">
+            <a:lvl9pPr marL="2743200" indent="0">
+              <a:buNone/>
+              <a:defRPr sz="1050">
                 <a:solidFill>
                   <a:schemeClr val="tx1">
                     <a:tint val="75000"/>
@@ -2807,7 +2822,7 @@
           <a:p>
             <a:fld id="{5BCAD085-E8A6-8845-BD4E-CB4CCA059FC4}" type="datetimeFigureOut">
               <a:rPr lang="en-US" smtClean="0"/>
-              <a:t>4/4/2025</a:t>
+              <a:t>4/5/2025</a:t>
             </a:fld>
             <a:endParaRPr lang="en-US"/>
           </a:p>
@@ -2863,8 +2878,8 @@
         </p:nvCxnSpPr>
         <p:spPr>
           <a:xfrm>
-            <a:off x="1278465" y="4140199"/>
-            <a:ext cx="6606425" cy="0"/>
+            <a:off x="1047127" y="3105149"/>
+            <a:ext cx="7055474" cy="0"/>
           </a:xfrm>
           <a:prstGeom prst="line">
             <a:avLst/>
@@ -2889,7 +2904,7 @@
     </p:spTree>
     <p:extLst>
       <p:ext uri="{BB962C8B-B14F-4D97-AF65-F5344CB8AC3E}">
-        <p14:creationId xmlns:p14="http://schemas.microsoft.com/office/powerpoint/2010/main" val="1289642778"/>
+        <p14:creationId xmlns:p14="http://schemas.microsoft.com/office/powerpoint/2010/main" val="513185859"/>
       </p:ext>
     </p:extLst>
   </p:cSld>
@@ -2928,8 +2943,8 @@
         </p:nvSpPr>
         <p:spPr>
           <a:xfrm>
-            <a:off x="1334333" y="982132"/>
-            <a:ext cx="6400250" cy="2370668"/>
+            <a:off x="1084660" y="736599"/>
+            <a:ext cx="6972299" cy="1778001"/>
           </a:xfrm>
         </p:spPr>
         <p:txBody>
@@ -2938,7 +2953,7 @@
           </a:bodyPr>
           <a:lstStyle>
             <a:lvl1pPr algn="ctr">
-              <a:defRPr sz="3200" b="0" cap="none">
+              <a:defRPr sz="2400" b="0" cap="none">
                 <a:solidFill>
                   <a:schemeClr val="tx1"/>
                 </a:solidFill>
@@ -2966,8 +2981,8 @@
         </p:nvSpPr>
         <p:spPr>
           <a:xfrm>
-            <a:off x="1600200" y="3352799"/>
-            <a:ext cx="5892798" cy="651933"/>
+            <a:off x="1256109" y="2514600"/>
+            <a:ext cx="6629402" cy="438150"/>
           </a:xfrm>
         </p:spPr>
         <p:txBody>
@@ -2978,24 +2993,24 @@
             <a:lvl1pPr marL="0" indent="0" algn="r">
               <a:buFontTx/>
               <a:buNone/>
-              <a:defRPr sz="1800"/>
+              <a:defRPr sz="1500"/>
             </a:lvl1pPr>
-            <a:lvl2pPr marL="457200" indent="0">
+            <a:lvl2pPr marL="342900" indent="0">
               <a:buFontTx/>
               <a:buNone/>
               <a:defRPr/>
             </a:lvl2pPr>
-            <a:lvl3pPr marL="914400" indent="0">
+            <a:lvl3pPr marL="685800" indent="0">
               <a:buFontTx/>
               <a:buNone/>
               <a:defRPr/>
             </a:lvl3pPr>
-            <a:lvl4pPr marL="1371600" indent="0">
+            <a:lvl4pPr marL="1028700" indent="0">
               <a:buFontTx/>
               <a:buNone/>
               <a:defRPr/>
             </a:lvl4pPr>
-            <a:lvl5pPr marL="1828800" indent="0">
+            <a:lvl5pPr marL="1371600" indent="0">
               <a:buFontTx/>
               <a:buNone/>
               <a:defRPr/>
@@ -3022,8 +3037,8 @@
         </p:nvSpPr>
         <p:spPr>
           <a:xfrm>
-            <a:off x="1176863" y="4343400"/>
-            <a:ext cx="6798738" cy="1532467"/>
+            <a:off x="971551" y="3257550"/>
+            <a:ext cx="7207250" cy="1149350"/>
           </a:xfrm>
         </p:spPr>
         <p:txBody>
@@ -3033,15 +3048,15 @@
           <a:lstStyle>
             <a:lvl1pPr marL="0" indent="0" algn="ctr">
               <a:buNone/>
-              <a:defRPr sz="2000">
+              <a:defRPr sz="1500">
                 <a:solidFill>
                   <a:schemeClr val="tx1"/>
                 </a:solidFill>
               </a:defRPr>
             </a:lvl1pPr>
-            <a:lvl2pPr marL="457200" indent="0">
-              <a:buNone/>
-              <a:defRPr sz="1800">
+            <a:lvl2pPr marL="342900" indent="0">
+              <a:buNone/>
+              <a:defRPr sz="1350">
                 <a:solidFill>
                   <a:schemeClr val="tx1">
                     <a:tint val="75000"/>
@@ -3049,9 +3064,9 @@
                 </a:solidFill>
               </a:defRPr>
             </a:lvl2pPr>
-            <a:lvl3pPr marL="914400" indent="0">
-              <a:buNone/>
-              <a:defRPr sz="1600">
+            <a:lvl3pPr marL="685800" indent="0">
+              <a:buNone/>
+              <a:defRPr sz="1200">
                 <a:solidFill>
                   <a:schemeClr val="tx1">
                     <a:tint val="75000"/>
@@ -3059,9 +3074,9 @@
                 </a:solidFill>
               </a:defRPr>
             </a:lvl3pPr>
-            <a:lvl4pPr marL="1371600" indent="0">
-              <a:buNone/>
-              <a:defRPr sz="1400">
+            <a:lvl4pPr marL="1028700" indent="0">
+              <a:buNone/>
+              <a:defRPr sz="1050">
                 <a:solidFill>
                   <a:schemeClr val="tx1">
                     <a:tint val="75000"/>
@@ -3069,9 +3084,9 @@
                 </a:solidFill>
               </a:defRPr>
             </a:lvl4pPr>
-            <a:lvl5pPr marL="1828800" indent="0">
-              <a:buNone/>
-              <a:defRPr sz="1400">
+            <a:lvl5pPr marL="1371600" indent="0">
+              <a:buNone/>
+              <a:defRPr sz="1050">
                 <a:solidFill>
                   <a:schemeClr val="tx1">
                     <a:tint val="75000"/>
@@ -3079,9 +3094,9 @@
                 </a:solidFill>
               </a:defRPr>
             </a:lvl5pPr>
-            <a:lvl6pPr marL="2286000" indent="0">
-              <a:buNone/>
-              <a:defRPr sz="1400">
+            <a:lvl6pPr marL="1714500" indent="0">
+              <a:buNone/>
+              <a:defRPr sz="1050">
                 <a:solidFill>
                   <a:schemeClr val="tx1">
                     <a:tint val="75000"/>
@@ -3089,9 +3104,9 @@
                 </a:solidFill>
               </a:defRPr>
             </a:lvl6pPr>
-            <a:lvl7pPr marL="2743200" indent="0">
-              <a:buNone/>
-              <a:defRPr sz="1400">
+            <a:lvl7pPr marL="2057400" indent="0">
+              <a:buNone/>
+              <a:defRPr sz="1050">
                 <a:solidFill>
                   <a:schemeClr val="tx1">
                     <a:tint val="75000"/>
@@ -3099,9 +3114,9 @@
                 </a:solidFill>
               </a:defRPr>
             </a:lvl7pPr>
-            <a:lvl8pPr marL="3200400" indent="0">
-              <a:buNone/>
-              <a:defRPr sz="1400">
+            <a:lvl8pPr marL="2400300" indent="0">
+              <a:buNone/>
+              <a:defRPr sz="1050">
                 <a:solidFill>
                   <a:schemeClr val="tx1">
                     <a:tint val="75000"/>
@@ -3109,9 +3124,9 @@
                 </a:solidFill>
               </a:defRPr>
             </a:lvl8pPr>
-            <a:lvl9pPr marL="3657600" indent="0">
-              <a:buNone/>
-              <a:defRPr sz="1400">
+            <a:lvl9pPr marL="2743200" indent="0">
+              <a:buNone/>
+              <a:defRPr sz="1050">
                 <a:solidFill>
                   <a:schemeClr val="tx1">
                     <a:tint val="75000"/>
@@ -3146,7 +3161,7 @@
           <a:p>
             <a:fld id="{5BCAD085-E8A6-8845-BD4E-CB4CCA059FC4}" type="datetimeFigureOut">
               <a:rPr lang="en-US" smtClean="0"/>
-              <a:t>4/4/2025</a:t>
+              <a:t>4/5/2025</a:t>
             </a:fld>
             <a:endParaRPr lang="en-US"/>
           </a:p>
@@ -3202,22 +3217,22 @@
         </p:nvSpPr>
         <p:spPr>
           <a:xfrm>
-            <a:off x="849969" y="905362"/>
-            <a:ext cx="457319" cy="584776"/>
+            <a:off x="646510" y="659971"/>
+            <a:ext cx="457200" cy="438582"/>
           </a:xfrm>
           <a:prstGeom prst="rect">
             <a:avLst/>
           </a:prstGeom>
         </p:spPr>
         <p:txBody>
-          <a:bodyPr vert="horz" lIns="91440" tIns="45720" rIns="91440" bIns="45720" rtlCol="0" anchor="ctr">
+          <a:bodyPr vert="horz" lIns="68580" tIns="34290" rIns="68580" bIns="34290" rtlCol="0" anchor="ctr">
             <a:noAutofit/>
           </a:bodyPr>
           <a:lstStyle/>
           <a:p>
             <a:pPr lvl="0"/>
             <a:r>
-              <a:rPr lang="en-US" sz="7200" dirty="0">
+              <a:rPr lang="en-US" sz="6000" dirty="0">
                 <a:solidFill>
                   <a:schemeClr val="tx1"/>
                 </a:solidFill>
@@ -3236,22 +3251,22 @@
         </p:nvSpPr>
         <p:spPr>
           <a:xfrm>
-            <a:off x="7633503" y="2827870"/>
-            <a:ext cx="457319" cy="584776"/>
+            <a:off x="7950200" y="2120903"/>
+            <a:ext cx="457200" cy="438582"/>
           </a:xfrm>
           <a:prstGeom prst="rect">
             <a:avLst/>
           </a:prstGeom>
         </p:spPr>
         <p:txBody>
-          <a:bodyPr vert="horz" lIns="91440" tIns="45720" rIns="91440" bIns="45720" rtlCol="0" anchor="ctr">
+          <a:bodyPr vert="horz" lIns="68580" tIns="34290" rIns="68580" bIns="34290" rtlCol="0" anchor="ctr">
             <a:noAutofit/>
           </a:bodyPr>
           <a:lstStyle/>
           <a:p>
             <a:pPr lvl="0" algn="r"/>
             <a:r>
-              <a:rPr lang="en-US" sz="7200" dirty="0">
+              <a:rPr lang="en-US" sz="6000" dirty="0">
                 <a:solidFill>
                   <a:schemeClr val="tx1"/>
                 </a:solidFill>
@@ -3270,8 +3285,8 @@
         </p:nvCxnSpPr>
         <p:spPr>
           <a:xfrm>
-            <a:off x="1278466" y="4140199"/>
-            <a:ext cx="6595534" cy="0"/>
+            <a:off x="1047127" y="3105149"/>
+            <a:ext cx="7055474" cy="0"/>
           </a:xfrm>
           <a:prstGeom prst="line">
             <a:avLst/>
@@ -3296,7 +3311,7 @@
     </p:spTree>
     <p:extLst>
       <p:ext uri="{BB962C8B-B14F-4D97-AF65-F5344CB8AC3E}">
-        <p14:creationId xmlns:p14="http://schemas.microsoft.com/office/powerpoint/2010/main" val="2889364001"/>
+        <p14:creationId xmlns:p14="http://schemas.microsoft.com/office/powerpoint/2010/main" val="2219848987"/>
       </p:ext>
     </p:extLst>
   </p:cSld>
@@ -3335,8 +3350,8 @@
         </p:nvSpPr>
         <p:spPr>
           <a:xfrm>
-            <a:off x="1176869" y="3308581"/>
-            <a:ext cx="6798728" cy="1468800"/>
+            <a:off x="971552" y="2481436"/>
+            <a:ext cx="7207251" cy="1101600"/>
           </a:xfrm>
         </p:spPr>
         <p:txBody>
@@ -3345,7 +3360,7 @@
           </a:bodyPr>
           <a:lstStyle>
             <a:lvl1pPr algn="l">
-              <a:defRPr sz="3200" b="0" cap="none"/>
+              <a:defRPr sz="2400" b="0" cap="none"/>
             </a:lvl1pPr>
           </a:lstStyle>
           <a:p>
@@ -3369,8 +3384,8 @@
         </p:nvSpPr>
         <p:spPr>
           <a:xfrm>
-            <a:off x="1176868" y="4777381"/>
-            <a:ext cx="6798730" cy="860400"/>
+            <a:off x="971551" y="3583036"/>
+            <a:ext cx="7207251" cy="645300"/>
           </a:xfrm>
         </p:spPr>
         <p:txBody>
@@ -3380,15 +3395,15 @@
           <a:lstStyle>
             <a:lvl1pPr marL="0" indent="0" algn="l">
               <a:buNone/>
-              <a:defRPr sz="1800">
+              <a:defRPr sz="1500">
                 <a:solidFill>
                   <a:schemeClr val="tx1"/>
                 </a:solidFill>
               </a:defRPr>
             </a:lvl1pPr>
-            <a:lvl2pPr marL="457200" indent="0">
-              <a:buNone/>
-              <a:defRPr sz="1800">
+            <a:lvl2pPr marL="342900" indent="0">
+              <a:buNone/>
+              <a:defRPr sz="1350">
                 <a:solidFill>
                   <a:schemeClr val="tx1">
                     <a:tint val="75000"/>
@@ -3396,9 +3411,9 @@
                 </a:solidFill>
               </a:defRPr>
             </a:lvl2pPr>
-            <a:lvl3pPr marL="914400" indent="0">
-              <a:buNone/>
-              <a:defRPr sz="1600">
+            <a:lvl3pPr marL="685800" indent="0">
+              <a:buNone/>
+              <a:defRPr sz="1200">
                 <a:solidFill>
                   <a:schemeClr val="tx1">
                     <a:tint val="75000"/>
@@ -3406,9 +3421,9 @@
                 </a:solidFill>
               </a:defRPr>
             </a:lvl3pPr>
-            <a:lvl4pPr marL="1371600" indent="0">
-              <a:buNone/>
-              <a:defRPr sz="1400">
+            <a:lvl4pPr marL="1028700" indent="0">
+              <a:buNone/>
+              <a:defRPr sz="1050">
                 <a:solidFill>
                   <a:schemeClr val="tx1">
                     <a:tint val="75000"/>
@@ -3416,9 +3431,9 @@
                 </a:solidFill>
               </a:defRPr>
             </a:lvl4pPr>
-            <a:lvl5pPr marL="1828800" indent="0">
-              <a:buNone/>
-              <a:defRPr sz="1400">
+            <a:lvl5pPr marL="1371600" indent="0">
+              <a:buNone/>
+              <a:defRPr sz="1050">
                 <a:solidFill>
                   <a:schemeClr val="tx1">
                     <a:tint val="75000"/>
@@ -3426,9 +3441,9 @@
                 </a:solidFill>
               </a:defRPr>
             </a:lvl5pPr>
-            <a:lvl6pPr marL="2286000" indent="0">
-              <a:buNone/>
-              <a:defRPr sz="1400">
+            <a:lvl6pPr marL="1714500" indent="0">
+              <a:buNone/>
+              <a:defRPr sz="1050">
                 <a:solidFill>
                   <a:schemeClr val="tx1">
                     <a:tint val="75000"/>
@@ -3436,9 +3451,9 @@
                 </a:solidFill>
               </a:defRPr>
             </a:lvl6pPr>
-            <a:lvl7pPr marL="2743200" indent="0">
-              <a:buNone/>
-              <a:defRPr sz="1400">
+            <a:lvl7pPr marL="2057400" indent="0">
+              <a:buNone/>
+              <a:defRPr sz="1050">
                 <a:solidFill>
                   <a:schemeClr val="tx1">
                     <a:tint val="75000"/>
@@ -3446,9 +3461,9 @@
                 </a:solidFill>
               </a:defRPr>
             </a:lvl7pPr>
-            <a:lvl8pPr marL="3200400" indent="0">
-              <a:buNone/>
-              <a:defRPr sz="1400">
+            <a:lvl8pPr marL="2400300" indent="0">
+              <a:buNone/>
+              <a:defRPr sz="1050">
                 <a:solidFill>
                   <a:schemeClr val="tx1">
                     <a:tint val="75000"/>
@@ -3456,9 +3471,9 @@
                 </a:solidFill>
               </a:defRPr>
             </a:lvl8pPr>
-            <a:lvl9pPr marL="3657600" indent="0">
-              <a:buNone/>
-              <a:defRPr sz="1400">
+            <a:lvl9pPr marL="2743200" indent="0">
+              <a:buNone/>
+              <a:defRPr sz="1050">
                 <a:solidFill>
                   <a:schemeClr val="tx1">
                     <a:tint val="75000"/>
@@ -3493,7 +3508,7 @@
           <a:p>
             <a:fld id="{5BCAD085-E8A6-8845-BD4E-CB4CCA059FC4}" type="datetimeFigureOut">
               <a:rPr lang="en-US" smtClean="0"/>
-              <a:t>4/4/2025</a:t>
+              <a:t>4/5/2025</a:t>
             </a:fld>
             <a:endParaRPr lang="en-US"/>
           </a:p>
@@ -3544,7 +3559,7 @@
     </p:spTree>
     <p:extLst>
       <p:ext uri="{BB962C8B-B14F-4D97-AF65-F5344CB8AC3E}">
-        <p14:creationId xmlns:p14="http://schemas.microsoft.com/office/powerpoint/2010/main" val="276538465"/>
+        <p14:creationId xmlns:p14="http://schemas.microsoft.com/office/powerpoint/2010/main" val="2407725848"/>
       </p:ext>
     </p:extLst>
   </p:cSld>
@@ -3583,8 +3598,8 @@
         </p:nvSpPr>
         <p:spPr>
           <a:xfrm>
-            <a:off x="1409416" y="982132"/>
-            <a:ext cx="6325168" cy="2243668"/>
+            <a:off x="1084660" y="736599"/>
+            <a:ext cx="6972299" cy="1682751"/>
           </a:xfrm>
         </p:spPr>
         <p:txBody>
@@ -3593,7 +3608,7 @@
           </a:bodyPr>
           <a:lstStyle>
             <a:lvl1pPr algn="ctr">
-              <a:defRPr sz="3200" b="0" cap="none">
+              <a:defRPr sz="2400" b="0" cap="none">
                 <a:solidFill>
                   <a:schemeClr val="tx1"/>
                 </a:solidFill>
@@ -3611,7 +3626,7 @@
       </p:sp>
       <p:sp>
         <p:nvSpPr>
-          <p:cNvPr id="18" name="Text Placeholder 2"/>
+          <p:cNvPr id="23" name="Text Placeholder 2"/>
           <p:cNvSpPr>
             <a:spLocks noGrp="1"/>
           </p:cNvSpPr>
@@ -3621,8 +3636,8 @@
         </p:nvSpPr>
         <p:spPr>
           <a:xfrm>
-            <a:off x="1176868" y="3639312"/>
-            <a:ext cx="6798730" cy="886968"/>
+            <a:off x="971551" y="2729484"/>
+            <a:ext cx="7207251" cy="665226"/>
           </a:xfrm>
         </p:spPr>
         <p:txBody>
@@ -3635,15 +3650,15 @@
                 <a:spcPts val="0"/>
               </a:spcBef>
               <a:buNone/>
-              <a:defRPr sz="2000">
+              <a:defRPr sz="1800">
                 <a:solidFill>
                   <a:schemeClr val="tx1"/>
                 </a:solidFill>
               </a:defRPr>
             </a:lvl1pPr>
-            <a:lvl2pPr marL="457200" indent="0">
-              <a:buNone/>
-              <a:defRPr sz="1800">
+            <a:lvl2pPr marL="342900" indent="0">
+              <a:buNone/>
+              <a:defRPr sz="1350">
                 <a:solidFill>
                   <a:schemeClr val="tx1">
                     <a:tint val="75000"/>
@@ -3651,9 +3666,9 @@
                 </a:solidFill>
               </a:defRPr>
             </a:lvl2pPr>
-            <a:lvl3pPr marL="914400" indent="0">
-              <a:buNone/>
-              <a:defRPr sz="1600">
+            <a:lvl3pPr marL="685800" indent="0">
+              <a:buNone/>
+              <a:defRPr sz="1200">
                 <a:solidFill>
                   <a:schemeClr val="tx1">
                     <a:tint val="75000"/>
@@ -3661,9 +3676,9 @@
                 </a:solidFill>
               </a:defRPr>
             </a:lvl3pPr>
-            <a:lvl4pPr marL="1371600" indent="0">
-              <a:buNone/>
-              <a:defRPr sz="1400">
+            <a:lvl4pPr marL="1028700" indent="0">
+              <a:buNone/>
+              <a:defRPr sz="1050">
                 <a:solidFill>
                   <a:schemeClr val="tx1">
                     <a:tint val="75000"/>
@@ -3671,9 +3686,9 @@
                 </a:solidFill>
               </a:defRPr>
             </a:lvl4pPr>
-            <a:lvl5pPr marL="1828800" indent="0">
-              <a:buNone/>
-              <a:defRPr sz="1400">
+            <a:lvl5pPr marL="1371600" indent="0">
+              <a:buNone/>
+              <a:defRPr sz="1050">
                 <a:solidFill>
                   <a:schemeClr val="tx1">
                     <a:tint val="75000"/>
@@ -3681,9 +3696,9 @@
                 </a:solidFill>
               </a:defRPr>
             </a:lvl5pPr>
-            <a:lvl6pPr marL="2286000" indent="0">
-              <a:buNone/>
-              <a:defRPr sz="1400">
+            <a:lvl6pPr marL="1714500" indent="0">
+              <a:buNone/>
+              <a:defRPr sz="1050">
                 <a:solidFill>
                   <a:schemeClr val="tx1">
                     <a:tint val="75000"/>
@@ -3691,9 +3706,9 @@
                 </a:solidFill>
               </a:defRPr>
             </a:lvl6pPr>
-            <a:lvl7pPr marL="2743200" indent="0">
-              <a:buNone/>
-              <a:defRPr sz="1400">
+            <a:lvl7pPr marL="2057400" indent="0">
+              <a:buNone/>
+              <a:defRPr sz="1050">
                 <a:solidFill>
                   <a:schemeClr val="tx1">
                     <a:tint val="75000"/>
@@ -3701,9 +3716,9 @@
                 </a:solidFill>
               </a:defRPr>
             </a:lvl7pPr>
-            <a:lvl8pPr marL="3200400" indent="0">
-              <a:buNone/>
-              <a:defRPr sz="1400">
+            <a:lvl8pPr marL="2400300" indent="0">
+              <a:buNone/>
+              <a:defRPr sz="1050">
                 <a:solidFill>
                   <a:schemeClr val="tx1">
                     <a:tint val="75000"/>
@@ -3711,9 +3726,9 @@
                 </a:solidFill>
               </a:defRPr>
             </a:lvl8pPr>
-            <a:lvl9pPr marL="3657600" indent="0">
-              <a:buNone/>
-              <a:defRPr sz="1400">
+            <a:lvl9pPr marL="2743200" indent="0">
+              <a:buNone/>
+              <a:defRPr sz="1050">
                 <a:solidFill>
                   <a:schemeClr val="tx1">
                     <a:tint val="75000"/>
@@ -3743,8 +3758,8 @@
         </p:nvSpPr>
         <p:spPr>
           <a:xfrm>
-            <a:off x="1176865" y="4529667"/>
-            <a:ext cx="6798736" cy="1346200"/>
+            <a:off x="971551" y="3397250"/>
+            <a:ext cx="7207251" cy="1009650"/>
           </a:xfrm>
         </p:spPr>
         <p:txBody>
@@ -3754,15 +3769,15 @@
           <a:lstStyle>
             <a:lvl1pPr marL="0" indent="0" algn="l">
               <a:buNone/>
-              <a:defRPr sz="1600">
+              <a:defRPr sz="1350">
                 <a:solidFill>
                   <a:schemeClr val="tx1"/>
                 </a:solidFill>
               </a:defRPr>
             </a:lvl1pPr>
-            <a:lvl2pPr marL="457200" indent="0">
-              <a:buNone/>
-              <a:defRPr sz="1600">
+            <a:lvl2pPr marL="342900" indent="0">
+              <a:buNone/>
+              <a:defRPr sz="1350">
                 <a:solidFill>
                   <a:schemeClr val="tx1">
                     <a:tint val="75000"/>
@@ -3770,9 +3785,9 @@
                 </a:solidFill>
               </a:defRPr>
             </a:lvl2pPr>
-            <a:lvl3pPr marL="914400" indent="0">
-              <a:buNone/>
-              <a:defRPr sz="1600">
+            <a:lvl3pPr marL="685800" indent="0">
+              <a:buNone/>
+              <a:defRPr sz="1200">
                 <a:solidFill>
                   <a:schemeClr val="tx1">
                     <a:tint val="75000"/>
@@ -3780,9 +3795,9 @@
                 </a:solidFill>
               </a:defRPr>
             </a:lvl3pPr>
-            <a:lvl4pPr marL="1371600" indent="0">
-              <a:buNone/>
-              <a:defRPr sz="1400">
+            <a:lvl4pPr marL="1028700" indent="0">
+              <a:buNone/>
+              <a:defRPr sz="1050">
                 <a:solidFill>
                   <a:schemeClr val="tx1">
                     <a:tint val="75000"/>
@@ -3790,9 +3805,9 @@
                 </a:solidFill>
               </a:defRPr>
             </a:lvl4pPr>
-            <a:lvl5pPr marL="1828800" indent="0">
-              <a:buNone/>
-              <a:defRPr sz="1400">
+            <a:lvl5pPr marL="1371600" indent="0">
+              <a:buNone/>
+              <a:defRPr sz="1050">
                 <a:solidFill>
                   <a:schemeClr val="tx1">
                     <a:tint val="75000"/>
@@ -3800,9 +3815,9 @@
                 </a:solidFill>
               </a:defRPr>
             </a:lvl5pPr>
-            <a:lvl6pPr marL="2286000" indent="0">
-              <a:buNone/>
-              <a:defRPr sz="1400">
+            <a:lvl6pPr marL="1714500" indent="0">
+              <a:buNone/>
+              <a:defRPr sz="1050">
                 <a:solidFill>
                   <a:schemeClr val="tx1">
                     <a:tint val="75000"/>
@@ -3810,9 +3825,9 @@
                 </a:solidFill>
               </a:defRPr>
             </a:lvl6pPr>
-            <a:lvl7pPr marL="2743200" indent="0">
-              <a:buNone/>
-              <a:defRPr sz="1400">
+            <a:lvl7pPr marL="2057400" indent="0">
+              <a:buNone/>
+              <a:defRPr sz="1050">
                 <a:solidFill>
                   <a:schemeClr val="tx1">
                     <a:tint val="75000"/>
@@ -3820,9 +3835,9 @@
                 </a:solidFill>
               </a:defRPr>
             </a:lvl7pPr>
-            <a:lvl8pPr marL="3200400" indent="0">
-              <a:buNone/>
-              <a:defRPr sz="1400">
+            <a:lvl8pPr marL="2400300" indent="0">
+              <a:buNone/>
+              <a:defRPr sz="1050">
                 <a:solidFill>
                   <a:schemeClr val="tx1">
                     <a:tint val="75000"/>
@@ -3830,9 +3845,9 @@
                 </a:solidFill>
               </a:defRPr>
             </a:lvl8pPr>
-            <a:lvl9pPr marL="3657600" indent="0">
-              <a:buNone/>
-              <a:defRPr sz="1400">
+            <a:lvl9pPr marL="2743200" indent="0">
+              <a:buNone/>
+              <a:defRPr sz="1050">
                 <a:solidFill>
                   <a:schemeClr val="tx1">
                     <a:tint val="75000"/>
@@ -3867,7 +3882,7 @@
           <a:p>
             <a:fld id="{5BCAD085-E8A6-8845-BD4E-CB4CCA059FC4}" type="datetimeFigureOut">
               <a:rPr lang="en-US" smtClean="0"/>
-              <a:t>4/4/2025</a:t>
+              <a:t>4/5/2025</a:t>
             </a:fld>
             <a:endParaRPr lang="en-US"/>
           </a:p>
@@ -3923,22 +3938,22 @@
         </p:nvSpPr>
         <p:spPr>
           <a:xfrm>
-            <a:off x="878060" y="896895"/>
-            <a:ext cx="457319" cy="584776"/>
+            <a:off x="646510" y="659971"/>
+            <a:ext cx="457200" cy="438582"/>
           </a:xfrm>
           <a:prstGeom prst="rect">
             <a:avLst/>
           </a:prstGeom>
         </p:spPr>
         <p:txBody>
-          <a:bodyPr vert="horz" lIns="91440" tIns="45720" rIns="91440" bIns="45720" rtlCol="0" anchor="ctr">
+          <a:bodyPr vert="horz" lIns="68580" tIns="34290" rIns="68580" bIns="34290" rtlCol="0" anchor="ctr">
             <a:noAutofit/>
           </a:bodyPr>
           <a:lstStyle/>
           <a:p>
             <a:pPr lvl="0"/>
             <a:r>
-              <a:rPr lang="en-US" sz="8000" dirty="0">
+              <a:rPr lang="en-US" sz="6000" dirty="0">
                 <a:solidFill>
                   <a:schemeClr val="tx1"/>
                 </a:solidFill>
@@ -3957,22 +3972,22 @@
         </p:nvSpPr>
         <p:spPr>
           <a:xfrm>
-            <a:off x="7649796" y="2607728"/>
-            <a:ext cx="457319" cy="584776"/>
+            <a:off x="7950200" y="1949446"/>
+            <a:ext cx="457200" cy="438582"/>
           </a:xfrm>
           <a:prstGeom prst="rect">
             <a:avLst/>
           </a:prstGeom>
         </p:spPr>
         <p:txBody>
-          <a:bodyPr vert="horz" lIns="91440" tIns="45720" rIns="91440" bIns="45720" rtlCol="0" anchor="ctr">
+          <a:bodyPr vert="horz" lIns="68580" tIns="34290" rIns="68580" bIns="34290" rtlCol="0" anchor="ctr">
             <a:noAutofit/>
           </a:bodyPr>
           <a:lstStyle/>
           <a:p>
             <a:pPr lvl="0" algn="r"/>
             <a:r>
-              <a:rPr lang="en-US" sz="8000" dirty="0">
+              <a:rPr lang="en-US" sz="6000" dirty="0">
                 <a:solidFill>
                   <a:schemeClr val="tx1"/>
                 </a:solidFill>
@@ -3991,8 +4006,8 @@
         </p:nvCxnSpPr>
         <p:spPr>
           <a:xfrm>
-            <a:off x="1278466" y="3429000"/>
-            <a:ext cx="6595534" cy="0"/>
+            <a:off x="1047127" y="2571750"/>
+            <a:ext cx="7055474" cy="0"/>
           </a:xfrm>
           <a:prstGeom prst="line">
             <a:avLst/>
@@ -4017,7 +4032,7 @@
     </p:spTree>
     <p:extLst>
       <p:ext uri="{BB962C8B-B14F-4D97-AF65-F5344CB8AC3E}">
-        <p14:creationId xmlns:p14="http://schemas.microsoft.com/office/powerpoint/2010/main" val="3554288875"/>
+        <p14:creationId xmlns:p14="http://schemas.microsoft.com/office/powerpoint/2010/main" val="2534706388"/>
       </p:ext>
     </p:extLst>
   </p:cSld>
@@ -4056,8 +4071,8 @@
         </p:nvSpPr>
         <p:spPr>
           <a:xfrm>
-            <a:off x="1176865" y="982131"/>
-            <a:ext cx="6798734" cy="2294467"/>
+            <a:off x="971551" y="736599"/>
+            <a:ext cx="7207250" cy="1682751"/>
           </a:xfrm>
         </p:spPr>
         <p:txBody>
@@ -4066,7 +4081,7 @@
           </a:bodyPr>
           <a:lstStyle>
             <a:lvl1pPr>
-              <a:defRPr lang="en-US" sz="3200" b="0" dirty="0"/>
+              <a:defRPr lang="en-US" b="0" dirty="0"/>
             </a:lvl1pPr>
           </a:lstStyle>
           <a:p>
@@ -4081,7 +4096,7 @@
       </p:sp>
       <p:sp>
         <p:nvSpPr>
-          <p:cNvPr id="14" name="Text Placeholder 2"/>
+          <p:cNvPr id="20" name="Text Placeholder 2"/>
           <p:cNvSpPr>
             <a:spLocks noGrp="1"/>
           </p:cNvSpPr>
@@ -4091,8 +4106,8 @@
         </p:nvSpPr>
         <p:spPr>
           <a:xfrm>
-            <a:off x="1176868" y="3566160"/>
-            <a:ext cx="6798730" cy="905256"/>
+            <a:off x="971551" y="2722626"/>
+            <a:ext cx="7207251" cy="630936"/>
           </a:xfrm>
         </p:spPr>
         <p:txBody>
@@ -4105,15 +4120,15 @@
                 <a:spcPts val="0"/>
               </a:spcBef>
               <a:buNone/>
-              <a:defRPr sz="2000">
+              <a:defRPr sz="2100">
                 <a:solidFill>
                   <a:schemeClr val="tx1"/>
                 </a:solidFill>
               </a:defRPr>
             </a:lvl1pPr>
-            <a:lvl2pPr marL="457200" indent="0">
-              <a:buNone/>
-              <a:defRPr sz="1800">
+            <a:lvl2pPr marL="342900" indent="0">
+              <a:buNone/>
+              <a:defRPr sz="1350">
                 <a:solidFill>
                   <a:schemeClr val="tx1">
                     <a:tint val="75000"/>
@@ -4121,9 +4136,9 @@
                 </a:solidFill>
               </a:defRPr>
             </a:lvl2pPr>
-            <a:lvl3pPr marL="914400" indent="0">
-              <a:buNone/>
-              <a:defRPr sz="1600">
+            <a:lvl3pPr marL="685800" indent="0">
+              <a:buNone/>
+              <a:defRPr sz="1200">
                 <a:solidFill>
                   <a:schemeClr val="tx1">
                     <a:tint val="75000"/>
@@ -4131,9 +4146,9 @@
                 </a:solidFill>
               </a:defRPr>
             </a:lvl3pPr>
-            <a:lvl4pPr marL="1371600" indent="0">
-              <a:buNone/>
-              <a:defRPr sz="1400">
+            <a:lvl4pPr marL="1028700" indent="0">
+              <a:buNone/>
+              <a:defRPr sz="1050">
                 <a:solidFill>
                   <a:schemeClr val="tx1">
                     <a:tint val="75000"/>
@@ -4141,9 +4156,9 @@
                 </a:solidFill>
               </a:defRPr>
             </a:lvl4pPr>
-            <a:lvl5pPr marL="1828800" indent="0">
-              <a:buNone/>
-              <a:defRPr sz="1400">
+            <a:lvl5pPr marL="1371600" indent="0">
+              <a:buNone/>
+              <a:defRPr sz="1050">
                 <a:solidFill>
                   <a:schemeClr val="tx1">
                     <a:tint val="75000"/>
@@ -4151,9 +4166,9 @@
                 </a:solidFill>
               </a:defRPr>
             </a:lvl5pPr>
-            <a:lvl6pPr marL="2286000" indent="0">
-              <a:buNone/>
-              <a:defRPr sz="1400">
+            <a:lvl6pPr marL="1714500" indent="0">
+              <a:buNone/>
+              <a:defRPr sz="1050">
                 <a:solidFill>
                   <a:schemeClr val="tx1">
                     <a:tint val="75000"/>
@@ -4161,9 +4176,9 @@
                 </a:solidFill>
               </a:defRPr>
             </a:lvl6pPr>
-            <a:lvl7pPr marL="2743200" indent="0">
-              <a:buNone/>
-              <a:defRPr sz="1400">
+            <a:lvl7pPr marL="2057400" indent="0">
+              <a:buNone/>
+              <a:defRPr sz="1050">
                 <a:solidFill>
                   <a:schemeClr val="tx1">
                     <a:tint val="75000"/>
@@ -4171,9 +4186,9 @@
                 </a:solidFill>
               </a:defRPr>
             </a:lvl7pPr>
-            <a:lvl8pPr marL="3200400" indent="0">
-              <a:buNone/>
-              <a:defRPr sz="1400">
+            <a:lvl8pPr marL="2400300" indent="0">
+              <a:buNone/>
+              <a:defRPr sz="1050">
                 <a:solidFill>
                   <a:schemeClr val="tx1">
                     <a:tint val="75000"/>
@@ -4181,9 +4196,9 @@
                 </a:solidFill>
               </a:defRPr>
             </a:lvl8pPr>
-            <a:lvl9pPr marL="3657600" indent="0">
-              <a:buNone/>
-              <a:defRPr sz="1400">
+            <a:lvl9pPr marL="2743200" indent="0">
+              <a:buNone/>
+              <a:defRPr sz="1050">
                 <a:solidFill>
                   <a:schemeClr val="tx1">
                     <a:tint val="75000"/>
@@ -4213,8 +4228,8 @@
         </p:nvSpPr>
         <p:spPr>
           <a:xfrm>
-            <a:off x="1176866" y="4470400"/>
-            <a:ext cx="6798734" cy="1405467"/>
+            <a:off x="971550" y="3352800"/>
+            <a:ext cx="7207253" cy="1054100"/>
           </a:xfrm>
         </p:spPr>
         <p:txBody>
@@ -4224,15 +4239,15 @@
           <a:lstStyle>
             <a:lvl1pPr marL="0" indent="0" algn="l">
               <a:buNone/>
-              <a:defRPr sz="1600">
+              <a:defRPr sz="1350">
                 <a:solidFill>
                   <a:schemeClr val="tx1"/>
                 </a:solidFill>
               </a:defRPr>
             </a:lvl1pPr>
-            <a:lvl2pPr marL="457200" indent="0">
-              <a:buNone/>
-              <a:defRPr sz="1600">
+            <a:lvl2pPr marL="342900" indent="0">
+              <a:buNone/>
+              <a:defRPr sz="1350">
                 <a:solidFill>
                   <a:schemeClr val="tx1">
                     <a:tint val="75000"/>
@@ -4240,9 +4255,9 @@
                 </a:solidFill>
               </a:defRPr>
             </a:lvl2pPr>
-            <a:lvl3pPr marL="914400" indent="0">
-              <a:buNone/>
-              <a:defRPr sz="1600">
+            <a:lvl3pPr marL="685800" indent="0">
+              <a:buNone/>
+              <a:defRPr sz="1200">
                 <a:solidFill>
                   <a:schemeClr val="tx1">
                     <a:tint val="75000"/>
@@ -4250,9 +4265,9 @@
                 </a:solidFill>
               </a:defRPr>
             </a:lvl3pPr>
-            <a:lvl4pPr marL="1371600" indent="0">
-              <a:buNone/>
-              <a:defRPr sz="1400">
+            <a:lvl4pPr marL="1028700" indent="0">
+              <a:buNone/>
+              <a:defRPr sz="1050">
                 <a:solidFill>
                   <a:schemeClr val="tx1">
                     <a:tint val="75000"/>
@@ -4260,9 +4275,9 @@
                 </a:solidFill>
               </a:defRPr>
             </a:lvl4pPr>
-            <a:lvl5pPr marL="1828800" indent="0">
-              <a:buNone/>
-              <a:defRPr sz="1400">
+            <a:lvl5pPr marL="1371600" indent="0">
+              <a:buNone/>
+              <a:defRPr sz="1050">
                 <a:solidFill>
                   <a:schemeClr val="tx1">
                     <a:tint val="75000"/>
@@ -4270,9 +4285,9 @@
                 </a:solidFill>
               </a:defRPr>
             </a:lvl5pPr>
-            <a:lvl6pPr marL="2286000" indent="0">
-              <a:buNone/>
-              <a:defRPr sz="1400">
+            <a:lvl6pPr marL="1714500" indent="0">
+              <a:buNone/>
+              <a:defRPr sz="1050">
                 <a:solidFill>
                   <a:schemeClr val="tx1">
                     <a:tint val="75000"/>
@@ -4280,9 +4295,9 @@
                 </a:solidFill>
               </a:defRPr>
             </a:lvl6pPr>
-            <a:lvl7pPr marL="2743200" indent="0">
-              <a:buNone/>
-              <a:defRPr sz="1400">
+            <a:lvl7pPr marL="2057400" indent="0">
+              <a:buNone/>
+              <a:defRPr sz="1050">
                 <a:solidFill>
                   <a:schemeClr val="tx1">
                     <a:tint val="75000"/>
@@ -4290,9 +4305,9 @@
                 </a:solidFill>
               </a:defRPr>
             </a:lvl7pPr>
-            <a:lvl8pPr marL="3200400" indent="0">
-              <a:buNone/>
-              <a:defRPr sz="1400">
+            <a:lvl8pPr marL="2400300" indent="0">
+              <a:buNone/>
+              <a:defRPr sz="1050">
                 <a:solidFill>
                   <a:schemeClr val="tx1">
                     <a:tint val="75000"/>
@@ -4300,9 +4315,9 @@
                 </a:solidFill>
               </a:defRPr>
             </a:lvl8pPr>
-            <a:lvl9pPr marL="3657600" indent="0">
-              <a:buNone/>
-              <a:defRPr sz="1400">
+            <a:lvl9pPr marL="2743200" indent="0">
+              <a:buNone/>
+              <a:defRPr sz="1050">
                 <a:solidFill>
                   <a:schemeClr val="tx1">
                     <a:tint val="75000"/>
@@ -4337,7 +4352,7 @@
           <a:p>
             <a:fld id="{5BCAD085-E8A6-8845-BD4E-CB4CCA059FC4}" type="datetimeFigureOut">
               <a:rPr lang="en-US" smtClean="0"/>
-              <a:t>4/4/2025</a:t>
+              <a:t>4/5/2025</a:t>
             </a:fld>
             <a:endParaRPr lang="en-US"/>
           </a:p>
@@ -4393,8 +4408,8 @@
         </p:nvCxnSpPr>
         <p:spPr>
           <a:xfrm>
-            <a:off x="1278469" y="3429000"/>
-            <a:ext cx="6606421" cy="0"/>
+            <a:off x="1047127" y="2571750"/>
+            <a:ext cx="7055474" cy="0"/>
           </a:xfrm>
           <a:prstGeom prst="line">
             <a:avLst/>
@@ -4419,7 +4434,7 @@
     </p:spTree>
     <p:extLst>
       <p:ext uri="{BB962C8B-B14F-4D97-AF65-F5344CB8AC3E}">
-        <p14:creationId xmlns:p14="http://schemas.microsoft.com/office/powerpoint/2010/main" val="1926772783"/>
+        <p14:creationId xmlns:p14="http://schemas.microsoft.com/office/powerpoint/2010/main" val="303279687"/>
       </p:ext>
     </p:extLst>
   </p:cSld>
@@ -4483,12 +4498,7 @@
             <p:ph type="body" orient="vert" idx="1"/>
           </p:nvPr>
         </p:nvSpPr>
-        <p:spPr>
-          <a:xfrm>
-            <a:off x="1176865" y="2490135"/>
-            <a:ext cx="6798736" cy="3385733"/>
-          </a:xfrm>
-        </p:spPr>
+        <p:spPr/>
         <p:txBody>
           <a:bodyPr vert="eaVert" anchor="t"/>
           <a:lstStyle/>
@@ -4547,7 +4557,7 @@
           <a:p>
             <a:fld id="{5BCAD085-E8A6-8845-BD4E-CB4CCA059FC4}" type="datetimeFigureOut">
               <a:rPr lang="en-US" smtClean="0"/>
-              <a:t>4/4/2025</a:t>
+              <a:t>4/5/2025</a:t>
             </a:fld>
             <a:endParaRPr lang="en-US"/>
           </a:p>
@@ -4603,8 +4613,8 @@
         </p:nvCxnSpPr>
         <p:spPr>
           <a:xfrm>
-            <a:off x="1278466" y="2354670"/>
-            <a:ext cx="6606424" cy="0"/>
+            <a:off x="1047127" y="1816100"/>
+            <a:ext cx="7055474" cy="0"/>
           </a:xfrm>
           <a:prstGeom prst="line">
             <a:avLst/>
@@ -4629,7 +4639,7 @@
     </p:spTree>
     <p:extLst>
       <p:ext uri="{BB962C8B-B14F-4D97-AF65-F5344CB8AC3E}">
-        <p14:creationId xmlns:p14="http://schemas.microsoft.com/office/powerpoint/2010/main" val="4085728384"/>
+        <p14:creationId xmlns:p14="http://schemas.microsoft.com/office/powerpoint/2010/main" val="3505985777"/>
       </p:ext>
     </p:extLst>
   </p:cSld>
@@ -4668,8 +4678,8 @@
         </p:nvSpPr>
         <p:spPr>
           <a:xfrm>
-            <a:off x="6356667" y="906873"/>
-            <a:ext cx="1618930" cy="4968995"/>
+            <a:off x="6749518" y="736599"/>
+            <a:ext cx="1418171" cy="3670301"/>
           </a:xfrm>
         </p:spPr>
         <p:txBody>
@@ -4696,8 +4706,8 @@
         </p:nvSpPr>
         <p:spPr>
           <a:xfrm>
-            <a:off x="1176867" y="906873"/>
-            <a:ext cx="4915509" cy="4968993"/>
+            <a:off x="971549" y="736599"/>
+            <a:ext cx="5574769" cy="3670301"/>
           </a:xfrm>
         </p:spPr>
         <p:txBody>
@@ -4758,7 +4768,7 @@
           <a:p>
             <a:fld id="{5BCAD085-E8A6-8845-BD4E-CB4CCA059FC4}" type="datetimeFigureOut">
               <a:rPr lang="en-US" smtClean="0"/>
-              <a:t>4/4/2025</a:t>
+              <a:t>4/5/2025</a:t>
             </a:fld>
             <a:endParaRPr lang="en-US"/>
           </a:p>
@@ -4814,8 +4824,8 @@
         </p:nvCxnSpPr>
         <p:spPr>
           <a:xfrm>
-            <a:off x="6245512" y="906873"/>
-            <a:ext cx="0" cy="4968993"/>
+            <a:off x="6647918" y="742950"/>
+            <a:ext cx="0" cy="3657600"/>
           </a:xfrm>
           <a:prstGeom prst="line">
             <a:avLst/>
@@ -4840,7 +4850,7 @@
     </p:spTree>
     <p:extLst>
       <p:ext uri="{BB962C8B-B14F-4D97-AF65-F5344CB8AC3E}">
-        <p14:creationId xmlns:p14="http://schemas.microsoft.com/office/powerpoint/2010/main" val="1027264438"/>
+        <p14:creationId xmlns:p14="http://schemas.microsoft.com/office/powerpoint/2010/main" val="1588998076"/>
       </p:ext>
     </p:extLst>
   </p:cSld>
@@ -4875,8 +4885,8 @@
         </p:nvCxnSpPr>
         <p:spPr>
           <a:xfrm>
-            <a:off x="1278465" y="2356260"/>
-            <a:ext cx="6595534" cy="0"/>
+            <a:off x="1047127" y="1816100"/>
+            <a:ext cx="7055474" cy="0"/>
           </a:xfrm>
           <a:prstGeom prst="line">
             <a:avLst/>
@@ -4990,7 +5000,7 @@
           <a:p>
             <a:fld id="{5BCAD085-E8A6-8845-BD4E-CB4CCA059FC4}" type="datetimeFigureOut">
               <a:rPr lang="en-US" smtClean="0"/>
-              <a:t>4/4/2025</a:t>
+              <a:t>4/5/2025</a:t>
             </a:fld>
             <a:endParaRPr lang="en-US"/>
           </a:p>
@@ -5041,7 +5051,7 @@
     </p:spTree>
     <p:extLst>
       <p:ext uri="{BB962C8B-B14F-4D97-AF65-F5344CB8AC3E}">
-        <p14:creationId xmlns:p14="http://schemas.microsoft.com/office/powerpoint/2010/main" val="927615260"/>
+        <p14:creationId xmlns:p14="http://schemas.microsoft.com/office/powerpoint/2010/main" val="2604799963"/>
       </p:ext>
     </p:extLst>
   </p:cSld>
@@ -5080,8 +5090,8 @@
         </p:nvSpPr>
         <p:spPr>
           <a:xfrm>
-            <a:off x="1278465" y="1641413"/>
-            <a:ext cx="6595534" cy="1822514"/>
+            <a:off x="1511302" y="1314454"/>
+            <a:ext cx="6119016" cy="1366886"/>
           </a:xfrm>
         </p:spPr>
         <p:txBody>
@@ -5090,7 +5100,7 @@
           </a:bodyPr>
           <a:lstStyle>
             <a:lvl1pPr algn="ctr">
-              <a:defRPr sz="4000" b="0" cap="none"/>
+              <a:defRPr sz="3300" b="0" cap="none"/>
             </a:lvl1pPr>
           </a:lstStyle>
           <a:p>
@@ -5114,8 +5124,8 @@
         </p:nvSpPr>
         <p:spPr>
           <a:xfrm>
-            <a:off x="1278465" y="3734859"/>
-            <a:ext cx="6595534" cy="1090015"/>
+            <a:off x="1511300" y="2884539"/>
+            <a:ext cx="6119018" cy="715910"/>
           </a:xfrm>
         </p:spPr>
         <p:txBody>
@@ -5125,15 +5135,15 @@
           <a:lstStyle>
             <a:lvl1pPr marL="0" indent="0" algn="ctr">
               <a:buNone/>
-              <a:defRPr sz="2400">
+              <a:defRPr sz="1800">
                 <a:solidFill>
                   <a:schemeClr val="tx1"/>
                 </a:solidFill>
               </a:defRPr>
             </a:lvl1pPr>
-            <a:lvl2pPr marL="457200" indent="0">
-              <a:buNone/>
-              <a:defRPr sz="1800">
+            <a:lvl2pPr marL="342900" indent="0">
+              <a:buNone/>
+              <a:defRPr sz="1350">
                 <a:solidFill>
                   <a:schemeClr val="tx1">
                     <a:tint val="75000"/>
@@ -5141,9 +5151,9 @@
                 </a:solidFill>
               </a:defRPr>
             </a:lvl2pPr>
-            <a:lvl3pPr marL="914400" indent="0">
-              <a:buNone/>
-              <a:defRPr sz="1600">
+            <a:lvl3pPr marL="685800" indent="0">
+              <a:buNone/>
+              <a:defRPr sz="1200">
                 <a:solidFill>
                   <a:schemeClr val="tx1">
                     <a:tint val="75000"/>
@@ -5151,9 +5161,9 @@
                 </a:solidFill>
               </a:defRPr>
             </a:lvl3pPr>
-            <a:lvl4pPr marL="1371600" indent="0">
-              <a:buNone/>
-              <a:defRPr sz="1400">
+            <a:lvl4pPr marL="1028700" indent="0">
+              <a:buNone/>
+              <a:defRPr sz="1050">
                 <a:solidFill>
                   <a:schemeClr val="tx1">
                     <a:tint val="75000"/>
@@ -5161,9 +5171,9 @@
                 </a:solidFill>
               </a:defRPr>
             </a:lvl4pPr>
-            <a:lvl5pPr marL="1828800" indent="0">
-              <a:buNone/>
-              <a:defRPr sz="1400">
+            <a:lvl5pPr marL="1371600" indent="0">
+              <a:buNone/>
+              <a:defRPr sz="1050">
                 <a:solidFill>
                   <a:schemeClr val="tx1">
                     <a:tint val="75000"/>
@@ -5171,9 +5181,9 @@
                 </a:solidFill>
               </a:defRPr>
             </a:lvl5pPr>
-            <a:lvl6pPr marL="2286000" indent="0">
-              <a:buNone/>
-              <a:defRPr sz="1400">
+            <a:lvl6pPr marL="1714500" indent="0">
+              <a:buNone/>
+              <a:defRPr sz="1050">
                 <a:solidFill>
                   <a:schemeClr val="tx1">
                     <a:tint val="75000"/>
@@ -5181,9 +5191,9 @@
                 </a:solidFill>
               </a:defRPr>
             </a:lvl6pPr>
-            <a:lvl7pPr marL="2743200" indent="0">
-              <a:buNone/>
-              <a:defRPr sz="1400">
+            <a:lvl7pPr marL="2057400" indent="0">
+              <a:buNone/>
+              <a:defRPr sz="1050">
                 <a:solidFill>
                   <a:schemeClr val="tx1">
                     <a:tint val="75000"/>
@@ -5191,9 +5201,9 @@
                 </a:solidFill>
               </a:defRPr>
             </a:lvl7pPr>
-            <a:lvl8pPr marL="3200400" indent="0">
-              <a:buNone/>
-              <a:defRPr sz="1400">
+            <a:lvl8pPr marL="2400300" indent="0">
+              <a:buNone/>
+              <a:defRPr sz="1050">
                 <a:solidFill>
                   <a:schemeClr val="tx1">
                     <a:tint val="75000"/>
@@ -5201,9 +5211,9 @@
                 </a:solidFill>
               </a:defRPr>
             </a:lvl8pPr>
-            <a:lvl9pPr marL="3657600" indent="0">
-              <a:buNone/>
-              <a:defRPr sz="1400">
+            <a:lvl9pPr marL="2743200" indent="0">
+              <a:buNone/>
+              <a:defRPr sz="1050">
                 <a:solidFill>
                   <a:schemeClr val="tx1">
                     <a:tint val="75000"/>
@@ -5238,7 +5248,7 @@
           <a:p>
             <a:fld id="{5BCAD085-E8A6-8845-BD4E-CB4CCA059FC4}" type="datetimeFigureOut">
               <a:rPr lang="en-US" smtClean="0"/>
-              <a:t>4/4/2025</a:t>
+              <a:t>4/5/2025</a:t>
             </a:fld>
             <a:endParaRPr lang="en-US"/>
           </a:p>
@@ -5288,14 +5298,14 @@
       </p:sp>
       <p:cxnSp>
         <p:nvCxnSpPr>
-          <p:cNvPr id="31" name="Straight Connector 30"/>
+          <p:cNvPr id="16" name="Straight Connector 15"/>
           <p:cNvCxnSpPr/>
           <p:nvPr/>
         </p:nvCxnSpPr>
         <p:spPr>
           <a:xfrm>
-            <a:off x="1278466" y="3599392"/>
-            <a:ext cx="6595533" cy="0"/>
+            <a:off x="1509542" y="2782939"/>
+            <a:ext cx="6122535" cy="0"/>
           </a:xfrm>
           <a:prstGeom prst="line">
             <a:avLst/>
@@ -5320,7 +5330,7 @@
     </p:spTree>
     <p:extLst>
       <p:ext uri="{BB962C8B-B14F-4D97-AF65-F5344CB8AC3E}">
-        <p14:creationId xmlns:p14="http://schemas.microsoft.com/office/powerpoint/2010/main" val="1588696797"/>
+        <p14:creationId xmlns:p14="http://schemas.microsoft.com/office/powerpoint/2010/main" val="2742793547"/>
       </p:ext>
     </p:extLst>
   </p:cSld>
@@ -5355,8 +5365,8 @@
         </p:nvCxnSpPr>
         <p:spPr>
           <a:xfrm>
-            <a:off x="1278465" y="2356260"/>
-            <a:ext cx="6595534" cy="0"/>
+            <a:off x="1047127" y="1816100"/>
+            <a:ext cx="7055474" cy="0"/>
           </a:xfrm>
           <a:prstGeom prst="line">
             <a:avLst/>
@@ -5388,38 +5398,33 @@
             <p:ph type="title"/>
           </p:nvPr>
         </p:nvSpPr>
+        <p:spPr/>
+        <p:txBody>
+          <a:bodyPr/>
+          <a:lstStyle/>
+          <a:p>
+            <a:r>
+              <a:rPr lang="en-US"/>
+              <a:t>Click to edit Master title style</a:t>
+            </a:r>
+            <a:endParaRPr lang="en-US" dirty="0"/>
+          </a:p>
+        </p:txBody>
+      </p:sp>
+      <p:sp>
+        <p:nvSpPr>
+          <p:cNvPr id="3" name="Content Placeholder 2"/>
+          <p:cNvSpPr>
+            <a:spLocks noGrp="1"/>
+          </p:cNvSpPr>
+          <p:nvPr>
+            <p:ph sz="half" idx="1"/>
+          </p:nvPr>
+        </p:nvSpPr>
         <p:spPr>
           <a:xfrm>
-            <a:off x="1176866" y="915337"/>
-            <a:ext cx="6798734" cy="1303867"/>
-          </a:xfrm>
-        </p:spPr>
-        <p:txBody>
-          <a:bodyPr/>
-          <a:lstStyle/>
-          <a:p>
-            <a:r>
-              <a:rPr lang="en-US"/>
-              <a:t>Click to edit Master title style</a:t>
-            </a:r>
-            <a:endParaRPr lang="en-US" dirty="0"/>
-          </a:p>
-        </p:txBody>
-      </p:sp>
-      <p:sp>
-        <p:nvSpPr>
-          <p:cNvPr id="3" name="Content Placeholder 2"/>
-          <p:cNvSpPr>
-            <a:spLocks noGrp="1"/>
-          </p:cNvSpPr>
-          <p:nvPr>
-            <p:ph sz="half" idx="1"/>
-          </p:nvPr>
-        </p:nvSpPr>
-        <p:spPr>
-          <a:xfrm>
-            <a:off x="1176866" y="2487168"/>
-            <a:ext cx="3337560" cy="3447288"/>
+            <a:off x="973836" y="1920240"/>
+            <a:ext cx="3538728" cy="2482596"/>
           </a:xfrm>
         </p:spPr>
         <p:txBody>
@@ -5477,8 +5482,8 @@
         </p:nvSpPr>
         <p:spPr>
           <a:xfrm>
-            <a:off x="4645152" y="2487168"/>
-            <a:ext cx="3337560" cy="3447288"/>
+            <a:off x="4636008" y="1920240"/>
+            <a:ext cx="3538728" cy="2482596"/>
           </a:xfrm>
         </p:spPr>
         <p:txBody>
@@ -5541,7 +5546,7 @@
           <a:p>
             <a:fld id="{5BCAD085-E8A6-8845-BD4E-CB4CCA059FC4}" type="datetimeFigureOut">
               <a:rPr lang="en-US" smtClean="0"/>
-              <a:t>4/4/2025</a:t>
+              <a:t>4/5/2025</a:t>
             </a:fld>
             <a:endParaRPr lang="en-US"/>
           </a:p>
@@ -5592,7 +5597,7 @@
     </p:spTree>
     <p:extLst>
       <p:ext uri="{BB962C8B-B14F-4D97-AF65-F5344CB8AC3E}">
-        <p14:creationId xmlns:p14="http://schemas.microsoft.com/office/powerpoint/2010/main" val="2222504303"/>
+        <p14:creationId xmlns:p14="http://schemas.microsoft.com/office/powerpoint/2010/main" val="1535711015"/>
       </p:ext>
     </p:extLst>
   </p:cSld>
@@ -5658,8 +5663,8 @@
         </p:nvSpPr>
         <p:spPr>
           <a:xfrm>
-            <a:off x="1176868" y="2658533"/>
-            <a:ext cx="3337560" cy="576262"/>
+            <a:off x="971550" y="1993900"/>
+            <a:ext cx="3538728" cy="432197"/>
           </a:xfrm>
         </p:spPr>
         <p:txBody>
@@ -5668,44 +5673,50 @@
           </a:bodyPr>
           <a:lstStyle>
             <a:lvl1pPr marL="0" indent="0">
-              <a:buNone/>
-              <a:defRPr sz="2400" b="0">
+              <a:spcBef>
+                <a:spcPts val="504"/>
+              </a:spcBef>
+              <a:spcAft>
+                <a:spcPts val="450"/>
+              </a:spcAft>
+              <a:buNone/>
+              <a:defRPr sz="2100" b="0">
                 <a:solidFill>
                   <a:schemeClr val="accent1"/>
                 </a:solidFill>
               </a:defRPr>
             </a:lvl1pPr>
-            <a:lvl2pPr marL="457200" indent="0">
-              <a:buNone/>
-              <a:defRPr sz="2000" b="1"/>
+            <a:lvl2pPr marL="342900" indent="0">
+              <a:buNone/>
+              <a:defRPr sz="1500" b="1"/>
             </a:lvl2pPr>
-            <a:lvl3pPr marL="914400" indent="0">
-              <a:buNone/>
-              <a:defRPr sz="1800" b="1"/>
+            <a:lvl3pPr marL="685800" indent="0">
+              <a:buNone/>
+              <a:defRPr sz="1350" b="1"/>
             </a:lvl3pPr>
-            <a:lvl4pPr marL="1371600" indent="0">
-              <a:buNone/>
-              <a:defRPr sz="1600" b="1"/>
+            <a:lvl4pPr marL="1028700" indent="0">
+              <a:buNone/>
+              <a:defRPr sz="1200" b="1"/>
             </a:lvl4pPr>
-            <a:lvl5pPr marL="1828800" indent="0">
-              <a:buNone/>
-              <a:defRPr sz="1600" b="1"/>
+            <a:lvl5pPr marL="1371600" indent="0">
+              <a:buNone/>
+              <a:defRPr sz="1200" b="1"/>
             </a:lvl5pPr>
-            <a:lvl6pPr marL="2286000" indent="0">
-              <a:buNone/>
-              <a:defRPr sz="1600" b="1"/>
+            <a:lvl6pPr marL="1714500" indent="0">
+              <a:buNone/>
+              <a:defRPr sz="1200" b="1"/>
             </a:lvl6pPr>
-            <a:lvl7pPr marL="2743200" indent="0">
-              <a:buNone/>
-              <a:defRPr sz="1600" b="1"/>
+            <a:lvl7pPr marL="2057400" indent="0">
+              <a:buNone/>
+              <a:defRPr sz="1200" b="1"/>
             </a:lvl7pPr>
-            <a:lvl8pPr marL="3200400" indent="0">
-              <a:buNone/>
-              <a:defRPr sz="1600" b="1"/>
+            <a:lvl8pPr marL="2400300" indent="0">
+              <a:buNone/>
+              <a:defRPr sz="1200" b="1"/>
             </a:lvl8pPr>
-            <a:lvl9pPr marL="3657600" indent="0">
-              <a:buNone/>
-              <a:defRPr sz="1600" b="1"/>
+            <a:lvl9pPr marL="2743200" indent="0">
+              <a:buNone/>
+              <a:defRPr sz="1200" b="1"/>
             </a:lvl9pPr>
           </a:lstStyle>
           <a:p>
@@ -5729,12 +5740,12 @@
         </p:nvSpPr>
         <p:spPr>
           <a:xfrm>
-            <a:off x="1176868" y="3243263"/>
-            <a:ext cx="3337560" cy="2706624"/>
+            <a:off x="971550" y="2432447"/>
+            <a:ext cx="3538728" cy="1974454"/>
           </a:xfrm>
         </p:spPr>
         <p:txBody>
-          <a:bodyPr>
+          <a:bodyPr anchor="t">
             <a:normAutofit/>
           </a:bodyPr>
           <a:lstStyle/>
@@ -5788,8 +5799,8 @@
         </p:nvSpPr>
         <p:spPr>
           <a:xfrm>
-            <a:off x="4641832" y="2658533"/>
-            <a:ext cx="3337560" cy="576262"/>
+            <a:off x="4635503" y="1993900"/>
+            <a:ext cx="3538728" cy="432197"/>
           </a:xfrm>
         </p:spPr>
         <p:txBody>
@@ -5798,44 +5809,50 @@
           </a:bodyPr>
           <a:lstStyle>
             <a:lvl1pPr marL="0" indent="0">
-              <a:buNone/>
-              <a:defRPr sz="2400" b="0">
+              <a:spcBef>
+                <a:spcPts val="504"/>
+              </a:spcBef>
+              <a:spcAft>
+                <a:spcPts val="450"/>
+              </a:spcAft>
+              <a:buNone/>
+              <a:defRPr sz="2100" b="0">
                 <a:solidFill>
                   <a:schemeClr val="accent1"/>
                 </a:solidFill>
               </a:defRPr>
             </a:lvl1pPr>
-            <a:lvl2pPr marL="457200" indent="0">
-              <a:buNone/>
-              <a:defRPr sz="2000" b="1"/>
+            <a:lvl2pPr marL="342900" indent="0">
+              <a:buNone/>
+              <a:defRPr sz="1500" b="1"/>
             </a:lvl2pPr>
-            <a:lvl3pPr marL="914400" indent="0">
-              <a:buNone/>
-              <a:defRPr sz="1800" b="1"/>
+            <a:lvl3pPr marL="685800" indent="0">
+              <a:buNone/>
+              <a:defRPr sz="1350" b="1"/>
             </a:lvl3pPr>
-            <a:lvl4pPr marL="1371600" indent="0">
-              <a:buNone/>
-              <a:defRPr sz="1600" b="1"/>
+            <a:lvl4pPr marL="1028700" indent="0">
+              <a:buNone/>
+              <a:defRPr sz="1200" b="1"/>
             </a:lvl4pPr>
-            <a:lvl5pPr marL="1828800" indent="0">
-              <a:buNone/>
-              <a:defRPr sz="1600" b="1"/>
+            <a:lvl5pPr marL="1371600" indent="0">
+              <a:buNone/>
+              <a:defRPr sz="1200" b="1"/>
             </a:lvl5pPr>
-            <a:lvl6pPr marL="2286000" indent="0">
-              <a:buNone/>
-              <a:defRPr sz="1600" b="1"/>
+            <a:lvl6pPr marL="1714500" indent="0">
+              <a:buNone/>
+              <a:defRPr sz="1200" b="1"/>
             </a:lvl6pPr>
-            <a:lvl7pPr marL="2743200" indent="0">
-              <a:buNone/>
-              <a:defRPr sz="1600" b="1"/>
+            <a:lvl7pPr marL="2057400" indent="0">
+              <a:buNone/>
+              <a:defRPr sz="1200" b="1"/>
             </a:lvl7pPr>
-            <a:lvl8pPr marL="3200400" indent="0">
-              <a:buNone/>
-              <a:defRPr sz="1600" b="1"/>
+            <a:lvl8pPr marL="2400300" indent="0">
+              <a:buNone/>
+              <a:defRPr sz="1200" b="1"/>
             </a:lvl8pPr>
-            <a:lvl9pPr marL="3657600" indent="0">
-              <a:buNone/>
-              <a:defRPr sz="1600" b="1"/>
+            <a:lvl9pPr marL="2743200" indent="0">
+              <a:buNone/>
+              <a:defRPr sz="1200" b="1"/>
             </a:lvl9pPr>
           </a:lstStyle>
           <a:p>
@@ -5859,12 +5876,12 @@
         </p:nvSpPr>
         <p:spPr>
           <a:xfrm>
-            <a:off x="4641832" y="3243263"/>
-            <a:ext cx="3337560" cy="2706624"/>
+            <a:off x="4635503" y="2432447"/>
+            <a:ext cx="3538728" cy="1974454"/>
           </a:xfrm>
         </p:spPr>
         <p:txBody>
-          <a:bodyPr>
+          <a:bodyPr anchor="t">
             <a:normAutofit/>
           </a:bodyPr>
           <a:lstStyle/>
@@ -5923,7 +5940,7 @@
           <a:p>
             <a:fld id="{5BCAD085-E8A6-8845-BD4E-CB4CCA059FC4}" type="datetimeFigureOut">
               <a:rPr lang="en-US" smtClean="0"/>
-              <a:t>4/4/2025</a:t>
+              <a:t>4/5/2025</a:t>
             </a:fld>
             <a:endParaRPr lang="en-US"/>
           </a:p>
@@ -5973,14 +5990,14 @@
       </p:sp>
       <p:cxnSp>
         <p:nvCxnSpPr>
-          <p:cNvPr id="41" name="Straight Connector 40"/>
+          <p:cNvPr id="18" name="Straight Connector 17"/>
           <p:cNvCxnSpPr/>
           <p:nvPr/>
         </p:nvCxnSpPr>
         <p:spPr>
           <a:xfrm>
-            <a:off x="1278466" y="2354670"/>
-            <a:ext cx="6595534" cy="0"/>
+            <a:off x="1047127" y="1816100"/>
+            <a:ext cx="7055474" cy="0"/>
           </a:xfrm>
           <a:prstGeom prst="line">
             <a:avLst/>
@@ -6005,7 +6022,7 @@
     </p:spTree>
     <p:extLst>
       <p:ext uri="{BB962C8B-B14F-4D97-AF65-F5344CB8AC3E}">
-        <p14:creationId xmlns:p14="http://schemas.microsoft.com/office/powerpoint/2010/main" val="1510041832"/>
+        <p14:creationId xmlns:p14="http://schemas.microsoft.com/office/powerpoint/2010/main" val="637856673"/>
       </p:ext>
     </p:extLst>
   </p:cSld>
@@ -6042,12 +6059,7 @@
             <p:ph type="title"/>
           </p:nvPr>
         </p:nvSpPr>
-        <p:spPr>
-          <a:xfrm>
-            <a:off x="1176865" y="915337"/>
-            <a:ext cx="6798735" cy="1303867"/>
-          </a:xfrm>
-        </p:spPr>
+        <p:spPr/>
         <p:txBody>
           <a:bodyPr/>
           <a:lstStyle/>
@@ -6077,7 +6089,7 @@
           <a:p>
             <a:fld id="{5BCAD085-E8A6-8845-BD4E-CB4CCA059FC4}" type="datetimeFigureOut">
               <a:rPr lang="en-US" smtClean="0"/>
-              <a:t>4/4/2025</a:t>
+              <a:t>4/5/2025</a:t>
             </a:fld>
             <a:endParaRPr lang="en-US"/>
           </a:p>
@@ -6133,8 +6145,8 @@
         </p:nvCxnSpPr>
         <p:spPr>
           <a:xfrm>
-            <a:off x="1278466" y="2354670"/>
-            <a:ext cx="6595534" cy="0"/>
+            <a:off x="1047127" y="1816100"/>
+            <a:ext cx="7055474" cy="0"/>
           </a:xfrm>
           <a:prstGeom prst="line">
             <a:avLst/>
@@ -6159,7 +6171,7 @@
     </p:spTree>
     <p:extLst>
       <p:ext uri="{BB962C8B-B14F-4D97-AF65-F5344CB8AC3E}">
-        <p14:creationId xmlns:p14="http://schemas.microsoft.com/office/powerpoint/2010/main" val="4273101170"/>
+        <p14:creationId xmlns:p14="http://schemas.microsoft.com/office/powerpoint/2010/main" val="3827433924"/>
       </p:ext>
     </p:extLst>
   </p:cSld>
@@ -6203,7 +6215,7 @@
           <a:p>
             <a:fld id="{5BCAD085-E8A6-8845-BD4E-CB4CCA059FC4}" type="datetimeFigureOut">
               <a:rPr lang="en-US" smtClean="0"/>
-              <a:t>4/4/2025</a:t>
+              <a:t>4/5/2025</a:t>
             </a:fld>
             <a:endParaRPr lang="en-US"/>
           </a:p>
@@ -6254,7 +6266,7 @@
     </p:spTree>
     <p:extLst>
       <p:ext uri="{BB962C8B-B14F-4D97-AF65-F5344CB8AC3E}">
-        <p14:creationId xmlns:p14="http://schemas.microsoft.com/office/powerpoint/2010/main" val="2915063296"/>
+        <p14:creationId xmlns:p14="http://schemas.microsoft.com/office/powerpoint/2010/main" val="1931625276"/>
       </p:ext>
     </p:extLst>
   </p:cSld>
@@ -6293,8 +6305,8 @@
         </p:nvSpPr>
         <p:spPr>
           <a:xfrm>
-            <a:off x="1176865" y="1388534"/>
-            <a:ext cx="2536798" cy="1371600"/>
+            <a:off x="970359" y="1041401"/>
+            <a:ext cx="2788841" cy="1028700"/>
           </a:xfrm>
         </p:spPr>
         <p:txBody>
@@ -6303,7 +6315,7 @@
           </a:bodyPr>
           <a:lstStyle>
             <a:lvl1pPr algn="ctr">
-              <a:defRPr sz="2400" b="0"/>
+              <a:defRPr sz="1800" b="0"/>
             </a:lvl1pPr>
           </a:lstStyle>
           <a:p>
@@ -6327,8 +6339,8 @@
         </p:nvSpPr>
         <p:spPr>
           <a:xfrm>
-            <a:off x="4120062" y="982132"/>
-            <a:ext cx="3855539" cy="4893735"/>
+            <a:off x="4064001" y="736599"/>
+            <a:ext cx="4102100" cy="3670301"/>
           </a:xfrm>
         </p:spPr>
         <p:txBody>
@@ -6386,8 +6398,8 @@
         </p:nvSpPr>
         <p:spPr>
           <a:xfrm>
-            <a:off x="1176865" y="3031065"/>
-            <a:ext cx="2536798" cy="2438404"/>
+            <a:off x="970359" y="2273299"/>
+            <a:ext cx="2788841" cy="1828803"/>
           </a:xfrm>
         </p:spPr>
         <p:txBody>
@@ -6397,39 +6409,39 @@
           <a:lstStyle>
             <a:lvl1pPr marL="0" indent="0" algn="ctr">
               <a:buNone/>
-              <a:defRPr sz="1600"/>
+              <a:defRPr sz="1200"/>
             </a:lvl1pPr>
-            <a:lvl2pPr marL="457200" indent="0">
-              <a:buNone/>
-              <a:defRPr sz="1200"/>
+            <a:lvl2pPr marL="342900" indent="0">
+              <a:buNone/>
+              <a:defRPr sz="900"/>
             </a:lvl2pPr>
-            <a:lvl3pPr marL="914400" indent="0">
-              <a:buNone/>
-              <a:defRPr sz="1000"/>
+            <a:lvl3pPr marL="685800" indent="0">
+              <a:buNone/>
+              <a:defRPr sz="750"/>
             </a:lvl3pPr>
-            <a:lvl4pPr marL="1371600" indent="0">
-              <a:buNone/>
-              <a:defRPr sz="900"/>
+            <a:lvl4pPr marL="1028700" indent="0">
+              <a:buNone/>
+              <a:defRPr sz="675"/>
             </a:lvl4pPr>
-            <a:lvl5pPr marL="1828800" indent="0">
-              <a:buNone/>
-              <a:defRPr sz="900"/>
+            <a:lvl5pPr marL="1371600" indent="0">
+              <a:buNone/>
+              <a:defRPr sz="675"/>
             </a:lvl5pPr>
-            <a:lvl6pPr marL="2286000" indent="0">
-              <a:buNone/>
-              <a:defRPr sz="900"/>
+            <a:lvl6pPr marL="1714500" indent="0">
+              <a:buNone/>
+              <a:defRPr sz="675"/>
             </a:lvl6pPr>
-            <a:lvl7pPr marL="2743200" indent="0">
-              <a:buNone/>
-              <a:defRPr sz="900"/>
+            <a:lvl7pPr marL="2057400" indent="0">
+              <a:buNone/>
+              <a:defRPr sz="675"/>
             </a:lvl7pPr>
-            <a:lvl8pPr marL="3200400" indent="0">
-              <a:buNone/>
-              <a:defRPr sz="900"/>
+            <a:lvl8pPr marL="2400300" indent="0">
+              <a:buNone/>
+              <a:defRPr sz="675"/>
             </a:lvl8pPr>
-            <a:lvl9pPr marL="3657600" indent="0">
-              <a:buNone/>
-              <a:defRPr sz="900"/>
+            <a:lvl9pPr marL="2743200" indent="0">
+              <a:buNone/>
+              <a:defRPr sz="675"/>
             </a:lvl9pPr>
           </a:lstStyle>
           <a:p>
@@ -6458,7 +6470,7 @@
           <a:p>
             <a:fld id="{5BCAD085-E8A6-8845-BD4E-CB4CCA059FC4}" type="datetimeFigureOut">
               <a:rPr lang="en-US" smtClean="0"/>
-              <a:t>4/4/2025</a:t>
+              <a:t>4/5/2025</a:t>
             </a:fld>
             <a:endParaRPr lang="en-US"/>
           </a:p>
@@ -6514,8 +6526,8 @@
         </p:nvCxnSpPr>
         <p:spPr>
           <a:xfrm>
-            <a:off x="1278466" y="2912533"/>
-            <a:ext cx="2333594" cy="0"/>
+            <a:off x="1047127" y="2184400"/>
+            <a:ext cx="2635874" cy="0"/>
           </a:xfrm>
           <a:prstGeom prst="line">
             <a:avLst/>
@@ -6540,7 +6552,7 @@
     </p:spTree>
     <p:extLst>
       <p:ext uri="{BB962C8B-B14F-4D97-AF65-F5344CB8AC3E}">
-        <p14:creationId xmlns:p14="http://schemas.microsoft.com/office/powerpoint/2010/main" val="2881969202"/>
+        <p14:creationId xmlns:p14="http://schemas.microsoft.com/office/powerpoint/2010/main" val="3508032831"/>
       </p:ext>
     </p:extLst>
   </p:cSld>
@@ -6579,8 +6591,8 @@
         </p:nvSpPr>
         <p:spPr>
           <a:xfrm>
-            <a:off x="1176865" y="1883832"/>
-            <a:ext cx="3632202" cy="1371600"/>
+            <a:off x="971549" y="1412874"/>
+            <a:ext cx="4681362" cy="1028700"/>
           </a:xfrm>
         </p:spPr>
         <p:txBody>
@@ -6589,7 +6601,7 @@
           </a:bodyPr>
           <a:lstStyle>
             <a:lvl1pPr algn="ctr">
-              <a:defRPr sz="2400" b="0"/>
+              <a:defRPr sz="2100" b="0"/>
             </a:lvl1pPr>
           </a:lstStyle>
           <a:p>
@@ -6613,8 +6625,8 @@
         </p:nvSpPr>
         <p:spPr>
           <a:xfrm>
-            <a:off x="5183069" y="1032933"/>
-            <a:ext cx="2929463" cy="4792136"/>
+            <a:off x="6071124" y="781050"/>
+            <a:ext cx="2297510" cy="3581400"/>
           </a:xfrm>
           <a:prstGeom prst="roundRect">
             <a:avLst>
@@ -6628,6 +6640,7 @@
                 <a:lumOff val="50000"/>
               </a:schemeClr>
             </a:solidFill>
+            <a:miter lim="800000"/>
           </a:ln>
           <a:effectLst>
             <a:innerShdw blurRad="57150" dist="38100" dir="14460000">
@@ -6644,39 +6657,39 @@
           <a:lstStyle>
             <a:lvl1pPr marL="0" indent="0" algn="ctr">
               <a:buNone/>
-              <a:defRPr sz="1600"/>
+              <a:defRPr sz="1200"/>
             </a:lvl1pPr>
-            <a:lvl2pPr marL="457200" indent="0">
-              <a:buNone/>
-              <a:defRPr sz="1600"/>
+            <a:lvl2pPr marL="342900" indent="0">
+              <a:buNone/>
+              <a:defRPr sz="1200"/>
             </a:lvl2pPr>
-            <a:lvl3pPr marL="914400" indent="0">
-              <a:buNone/>
-              <a:defRPr sz="1600"/>
+            <a:lvl3pPr marL="685800" indent="0">
+              <a:buNone/>
+              <a:defRPr sz="1200"/>
             </a:lvl3pPr>
-            <a:lvl4pPr marL="1371600" indent="0">
-              <a:buNone/>
-              <a:defRPr sz="1600"/>
+            <a:lvl4pPr marL="1028700" indent="0">
+              <a:buNone/>
+              <a:defRPr sz="1200"/>
             </a:lvl4pPr>
-            <a:lvl5pPr marL="1828800" indent="0">
-              <a:buNone/>
-              <a:defRPr sz="1600"/>
+            <a:lvl5pPr marL="1371600" indent="0">
+              <a:buNone/>
+              <a:defRPr sz="1200"/>
             </a:lvl5pPr>
-            <a:lvl6pPr marL="2286000" indent="0">
-              <a:buNone/>
-              <a:defRPr sz="1600"/>
+            <a:lvl6pPr marL="1714500" indent="0">
+              <a:buNone/>
+              <a:defRPr sz="1200"/>
             </a:lvl6pPr>
-            <a:lvl7pPr marL="2743200" indent="0">
-              <a:buNone/>
-              <a:defRPr sz="1600"/>
+            <a:lvl7pPr marL="2057400" indent="0">
+              <a:buNone/>
+              <a:defRPr sz="1200"/>
             </a:lvl7pPr>
-            <a:lvl8pPr marL="3200400" indent="0">
-              <a:buNone/>
-              <a:defRPr sz="1600"/>
+            <a:lvl8pPr marL="2400300" indent="0">
+              <a:buNone/>
+              <a:defRPr sz="1200"/>
             </a:lvl8pPr>
-            <a:lvl9pPr marL="3657600" indent="0">
-              <a:buNone/>
-              <a:defRPr sz="1600"/>
+            <a:lvl9pPr marL="2743200" indent="0">
+              <a:buNone/>
+              <a:defRPr sz="1200"/>
             </a:lvl9pPr>
           </a:lstStyle>
           <a:p>
@@ -6700,8 +6713,8 @@
         </p:nvSpPr>
         <p:spPr>
           <a:xfrm>
-            <a:off x="1176865" y="3255432"/>
-            <a:ext cx="3632201" cy="1828800"/>
+            <a:off x="971549" y="2441574"/>
+            <a:ext cx="4681362" cy="1371600"/>
           </a:xfrm>
         </p:spPr>
         <p:txBody>
@@ -6711,39 +6724,39 @@
           <a:lstStyle>
             <a:lvl1pPr marL="0" indent="0" algn="ctr">
               <a:buNone/>
-              <a:defRPr sz="1600"/>
+              <a:defRPr sz="1350"/>
             </a:lvl1pPr>
-            <a:lvl2pPr marL="457200" indent="0">
-              <a:buNone/>
-              <a:defRPr sz="1200"/>
+            <a:lvl2pPr marL="342900" indent="0">
+              <a:buNone/>
+              <a:defRPr sz="900"/>
             </a:lvl2pPr>
-            <a:lvl3pPr marL="914400" indent="0">
-              <a:buNone/>
-              <a:defRPr sz="1000"/>
+            <a:lvl3pPr marL="685800" indent="0">
+              <a:buNone/>
+              <a:defRPr sz="750"/>
             </a:lvl3pPr>
-            <a:lvl4pPr marL="1371600" indent="0">
-              <a:buNone/>
-              <a:defRPr sz="900"/>
+            <a:lvl4pPr marL="1028700" indent="0">
+              <a:buNone/>
+              <a:defRPr sz="675"/>
             </a:lvl4pPr>
-            <a:lvl5pPr marL="1828800" indent="0">
-              <a:buNone/>
-              <a:defRPr sz="900"/>
+            <a:lvl5pPr marL="1371600" indent="0">
+              <a:buNone/>
+              <a:defRPr sz="675"/>
             </a:lvl5pPr>
-            <a:lvl6pPr marL="2286000" indent="0">
-              <a:buNone/>
-              <a:defRPr sz="900"/>
+            <a:lvl6pPr marL="1714500" indent="0">
+              <a:buNone/>
+              <a:defRPr sz="675"/>
             </a:lvl6pPr>
-            <a:lvl7pPr marL="2743200" indent="0">
-              <a:buNone/>
-              <a:defRPr sz="900"/>
+            <a:lvl7pPr marL="2057400" indent="0">
+              <a:buNone/>
+              <a:defRPr sz="675"/>
             </a:lvl7pPr>
-            <a:lvl8pPr marL="3200400" indent="0">
-              <a:buNone/>
-              <a:defRPr sz="900"/>
+            <a:lvl8pPr marL="2400300" indent="0">
+              <a:buNone/>
+              <a:defRPr sz="675"/>
             </a:lvl8pPr>
-            <a:lvl9pPr marL="3657600" indent="0">
-              <a:buNone/>
-              <a:defRPr sz="900"/>
+            <a:lvl9pPr marL="2743200" indent="0">
+              <a:buNone/>
+              <a:defRPr sz="675"/>
             </a:lvl9pPr>
           </a:lstStyle>
           <a:p>
@@ -6772,7 +6785,7 @@
           <a:p>
             <a:fld id="{5BCAD085-E8A6-8845-BD4E-CB4CCA059FC4}" type="datetimeFigureOut">
               <a:rPr lang="en-US" smtClean="0"/>
-              <a:t>4/4/2025</a:t>
+              <a:t>4/5/2025</a:t>
             </a:fld>
             <a:endParaRPr lang="en-US"/>
           </a:p>
@@ -6823,7 +6836,7 @@
     </p:spTree>
     <p:extLst>
       <p:ext uri="{BB962C8B-B14F-4D97-AF65-F5344CB8AC3E}">
-        <p14:creationId xmlns:p14="http://schemas.microsoft.com/office/powerpoint/2010/main" val="116542877"/>
+        <p14:creationId xmlns:p14="http://schemas.microsoft.com/office/powerpoint/2010/main" val="1654205131"/>
       </p:ext>
     </p:extLst>
   </p:cSld>
@@ -6863,15 +6876,15 @@
         </p:nvGrpSpPr>
         <p:grpSpPr>
           <a:xfrm>
-            <a:off x="0" y="0"/>
-            <a:ext cx="9152467" cy="6858000"/>
-            <a:chOff x="0" y="0"/>
-            <a:chExt cx="9152467" cy="6858000"/>
+            <a:off x="-11802" y="0"/>
+            <a:ext cx="9172472" cy="5142161"/>
+            <a:chOff x="-15736" y="0"/>
+            <a:chExt cx="12229962" cy="6856214"/>
           </a:xfrm>
         </p:grpSpPr>
         <p:pic>
           <p:nvPicPr>
-            <p:cNvPr id="8" name="Picture 7" descr="SD-PanelContent.png"/>
+            <p:cNvPr id="8" name="Picture 7" descr="HD-PanelContent.png"/>
             <p:cNvPicPr>
               <a:picLocks noChangeAspect="1"/>
             </p:cNvPicPr>
@@ -6892,7 +6905,7 @@
           <p:spPr>
             <a:xfrm>
               <a:off x="0" y="0"/>
-              <a:ext cx="9144000" cy="6858000"/>
+              <a:ext cx="12188825" cy="6856214"/>
             </a:xfrm>
             <a:prstGeom prst="rect">
               <a:avLst/>
@@ -6907,8 +6920,8 @@
           </p:nvSpPr>
           <p:spPr>
             <a:xfrm>
-              <a:off x="553888" y="542807"/>
-              <a:ext cx="8039776" cy="5756392"/>
+              <a:off x="608012" y="609600"/>
+              <a:ext cx="10972800" cy="5638800"/>
             </a:xfrm>
             <a:prstGeom prst="rect">
               <a:avLst/>
@@ -6949,13 +6962,13 @@
                 </a:ext>
               </a:extLst>
             </a:blip>
-            <a:srcRect l="1" r="14240"/>
+            <a:srcRect/>
             <a:stretch/>
           </p:blipFill>
           <p:spPr>
             <a:xfrm>
-              <a:off x="0" y="3128434"/>
-              <a:ext cx="685800" cy="606425"/>
+              <a:off x="-15736" y="3153832"/>
+              <a:ext cx="777240" cy="606425"/>
             </a:xfrm>
             <a:prstGeom prst="rect">
               <a:avLst/>
@@ -6978,13 +6991,13 @@
                 </a:ext>
               </a:extLst>
             </a:blip>
-            <a:srcRect l="1" r="14240"/>
+            <a:srcRect/>
             <a:stretch/>
           </p:blipFill>
           <p:spPr>
             <a:xfrm>
-              <a:off x="8466667" y="3128434"/>
-              <a:ext cx="685800" cy="606425"/>
+              <a:off x="11436986" y="3153832"/>
+              <a:ext cx="777240" cy="606425"/>
             </a:xfrm>
             <a:prstGeom prst="rect">
               <a:avLst/>
@@ -7004,8 +7017,8 @@
         </p:nvSpPr>
         <p:spPr>
           <a:xfrm>
-            <a:off x="1176866" y="915337"/>
-            <a:ext cx="6798734" cy="1303867"/>
+            <a:off x="971552" y="736600"/>
+            <a:ext cx="7200897" cy="977900"/>
           </a:xfrm>
           <a:prstGeom prst="rect">
             <a:avLst/>
@@ -7038,8 +7051,8 @@
         </p:nvSpPr>
         <p:spPr>
           <a:xfrm>
-            <a:off x="1176865" y="2490135"/>
-            <a:ext cx="6798736" cy="3444997"/>
+            <a:off x="971551" y="1917699"/>
+            <a:ext cx="7200897" cy="2489202"/>
           </a:xfrm>
           <a:prstGeom prst="rect">
             <a:avLst/>
@@ -7100,8 +7113,8 @@
         </p:nvSpPr>
         <p:spPr>
           <a:xfrm>
-            <a:off x="6356670" y="5960533"/>
-            <a:ext cx="1148283" cy="279400"/>
+            <a:off x="6508126" y="4476750"/>
+            <a:ext cx="1200150" cy="209550"/>
           </a:xfrm>
           <a:prstGeom prst="rect">
             <a:avLst/>
@@ -7111,7 +7124,7 @@
           <a:bodyPr vert="horz" lIns="91440" tIns="45720" rIns="91440" bIns="45720" rtlCol="0" anchor="ctr"/>
           <a:lstStyle>
             <a:lvl1pPr algn="r">
-              <a:defRPr sz="1000" b="0" i="0">
+              <a:defRPr sz="750" b="0" i="0">
                 <a:solidFill>
                   <a:schemeClr val="tx1"/>
                 </a:solidFill>
@@ -7123,7 +7136,7 @@
           <a:p>
             <a:fld id="{5BCAD085-E8A6-8845-BD4E-CB4CCA059FC4}" type="datetimeFigureOut">
               <a:rPr lang="en-US" smtClean="0"/>
-              <a:t>4/4/2025</a:t>
+              <a:t>4/5/2025</a:t>
             </a:fld>
             <a:endParaRPr lang="en-US"/>
           </a:p>
@@ -7141,8 +7154,8 @@
         </p:nvSpPr>
         <p:spPr>
           <a:xfrm>
-            <a:off x="1176865" y="5960533"/>
-            <a:ext cx="5104667" cy="279400"/>
+            <a:off x="971551" y="4476750"/>
+            <a:ext cx="5479425" cy="209550"/>
           </a:xfrm>
           <a:prstGeom prst="rect">
             <a:avLst/>
@@ -7152,7 +7165,7 @@
           <a:bodyPr vert="horz" lIns="91440" tIns="45720" rIns="91440" bIns="45720" rtlCol="0" anchor="ctr"/>
           <a:lstStyle>
             <a:lvl1pPr algn="l">
-              <a:defRPr sz="1000" b="0" i="0">
+              <a:defRPr sz="750" b="0" i="0">
                 <a:solidFill>
                   <a:schemeClr val="tx1"/>
                 </a:solidFill>
@@ -7178,8 +7191,8 @@
         </p:nvSpPr>
         <p:spPr>
           <a:xfrm>
-            <a:off x="7580091" y="5960533"/>
-            <a:ext cx="395510" cy="279400"/>
+            <a:off x="7765426" y="4476750"/>
+            <a:ext cx="407023" cy="209550"/>
           </a:xfrm>
           <a:prstGeom prst="rect">
             <a:avLst/>
@@ -7189,7 +7202,7 @@
           <a:bodyPr vert="horz" lIns="91440" tIns="45720" rIns="91440" bIns="45720" rtlCol="0" anchor="ctr"/>
           <a:lstStyle>
             <a:lvl1pPr algn="r">
-              <a:defRPr sz="1000" b="0" i="0">
+              <a:defRPr sz="750" b="0" i="0">
                 <a:solidFill>
                   <a:schemeClr val="tx1"/>
                 </a:solidFill>
@@ -7210,38 +7223,38 @@
     </p:spTree>
     <p:extLst>
       <p:ext uri="{BB962C8B-B14F-4D97-AF65-F5344CB8AC3E}">
-        <p14:creationId xmlns:p14="http://schemas.microsoft.com/office/powerpoint/2010/main" val="2369383040"/>
+        <p14:creationId xmlns:p14="http://schemas.microsoft.com/office/powerpoint/2010/main" val="3329152649"/>
       </p:ext>
     </p:extLst>
   </p:cSld>
   <p:clrMap bg1="lt1" tx1="dk1" bg2="lt2" tx2="dk2" accent1="accent1" accent2="accent2" accent3="accent3" accent4="accent4" accent5="accent5" accent6="accent6" hlink="hlink" folHlink="folHlink"/>
   <p:sldLayoutIdLst>
-    <p:sldLayoutId id="2147483661" r:id="rId1"/>
-    <p:sldLayoutId id="2147483662" r:id="rId2"/>
-    <p:sldLayoutId id="2147483663" r:id="rId3"/>
-    <p:sldLayoutId id="2147483664" r:id="rId4"/>
-    <p:sldLayoutId id="2147483665" r:id="rId5"/>
-    <p:sldLayoutId id="2147483666" r:id="rId6"/>
-    <p:sldLayoutId id="2147483667" r:id="rId7"/>
-    <p:sldLayoutId id="2147483668" r:id="rId8"/>
-    <p:sldLayoutId id="2147483669" r:id="rId9"/>
-    <p:sldLayoutId id="2147483670" r:id="rId10"/>
-    <p:sldLayoutId id="2147483671" r:id="rId11"/>
-    <p:sldLayoutId id="2147483672" r:id="rId12"/>
-    <p:sldLayoutId id="2147483673" r:id="rId13"/>
-    <p:sldLayoutId id="2147483674" r:id="rId14"/>
-    <p:sldLayoutId id="2147483675" r:id="rId15"/>
-    <p:sldLayoutId id="2147483676" r:id="rId16"/>
-    <p:sldLayoutId id="2147483677" r:id="rId17"/>
+    <p:sldLayoutId id="2147483679" r:id="rId1"/>
+    <p:sldLayoutId id="2147483680" r:id="rId2"/>
+    <p:sldLayoutId id="2147483681" r:id="rId3"/>
+    <p:sldLayoutId id="2147483682" r:id="rId4"/>
+    <p:sldLayoutId id="2147483683" r:id="rId5"/>
+    <p:sldLayoutId id="2147483684" r:id="rId6"/>
+    <p:sldLayoutId id="2147483685" r:id="rId7"/>
+    <p:sldLayoutId id="2147483686" r:id="rId8"/>
+    <p:sldLayoutId id="2147483687" r:id="rId9"/>
+    <p:sldLayoutId id="2147483688" r:id="rId10"/>
+    <p:sldLayoutId id="2147483689" r:id="rId11"/>
+    <p:sldLayoutId id="2147483690" r:id="rId12"/>
+    <p:sldLayoutId id="2147483691" r:id="rId13"/>
+    <p:sldLayoutId id="2147483692" r:id="rId14"/>
+    <p:sldLayoutId id="2147483693" r:id="rId15"/>
+    <p:sldLayoutId id="2147483694" r:id="rId16"/>
+    <p:sldLayoutId id="2147483695" r:id="rId17"/>
   </p:sldLayoutIdLst>
   <p:txStyles>
     <p:titleStyle>
-      <a:lvl1pPr algn="ctr" defTabSz="457200" rtl="0" eaLnBrk="1" latinLnBrk="0" hangingPunct="1">
+      <a:lvl1pPr algn="ctr" defTabSz="342900" rtl="0" eaLnBrk="1" latinLnBrk="0" hangingPunct="1">
         <a:spcBef>
           <a:spcPct val="0"/>
         </a:spcBef>
         <a:buNone/>
-        <a:defRPr sz="4000" kern="1200" cap="none">
+        <a:defRPr sz="3300" kern="1200" cap="none">
           <a:ln w="3175" cmpd="sng">
             <a:noFill/>
           </a:ln>
@@ -7315,64 +7328,12 @@
       </a:lvl9pPr>
     </p:titleStyle>
     <p:bodyStyle>
-      <a:lvl1pPr marL="285750" indent="-285750" algn="l" defTabSz="457200" rtl="0" eaLnBrk="1" latinLnBrk="0" hangingPunct="1">
+      <a:lvl1pPr marL="214313" indent="-214313" algn="l" defTabSz="342900" rtl="0" eaLnBrk="1" latinLnBrk="0" hangingPunct="1">
         <a:spcBef>
           <a:spcPct val="20000"/>
         </a:spcBef>
         <a:spcAft>
-          <a:spcPts val="600"/>
-        </a:spcAft>
-        <a:buClr>
-          <a:schemeClr val="accent1"/>
-        </a:buClr>
-        <a:buSzPct val="115000"/>
-        <a:buFont typeface="Arial"/>
-        <a:buChar char="•"/>
-        <a:defRPr sz="2400" kern="1200" cap="none">
-          <a:solidFill>
-            <a:schemeClr val="tx1">
-              <a:lumMod val="85000"/>
-              <a:lumOff val="15000"/>
-            </a:schemeClr>
-          </a:solidFill>
-          <a:effectLst/>
-          <a:latin typeface="+mn-lt"/>
-          <a:ea typeface="+mn-ea"/>
-          <a:cs typeface="+mn-cs"/>
-        </a:defRPr>
-      </a:lvl1pPr>
-      <a:lvl2pPr marL="742950" indent="-285750" algn="l" defTabSz="457200" rtl="0" eaLnBrk="1" latinLnBrk="0" hangingPunct="1">
-        <a:spcBef>
-          <a:spcPct val="20000"/>
-        </a:spcBef>
-        <a:spcAft>
-          <a:spcPts val="600"/>
-        </a:spcAft>
-        <a:buClr>
-          <a:schemeClr val="accent1"/>
-        </a:buClr>
-        <a:buSzPct val="115000"/>
-        <a:buFont typeface="Arial"/>
-        <a:buChar char="•"/>
-        <a:defRPr sz="2000" kern="1200" cap="none">
-          <a:solidFill>
-            <a:schemeClr val="tx1">
-              <a:lumMod val="85000"/>
-              <a:lumOff val="15000"/>
-            </a:schemeClr>
-          </a:solidFill>
-          <a:effectLst/>
-          <a:latin typeface="+mn-lt"/>
-          <a:ea typeface="+mn-ea"/>
-          <a:cs typeface="+mn-cs"/>
-        </a:defRPr>
-      </a:lvl2pPr>
-      <a:lvl3pPr marL="1200150" indent="-285750" algn="l" defTabSz="457200" rtl="0" eaLnBrk="1" latinLnBrk="0" hangingPunct="1">
-        <a:spcBef>
-          <a:spcPct val="20000"/>
-        </a:spcBef>
-        <a:spcAft>
-          <a:spcPts val="600"/>
+          <a:spcPts val="450"/>
         </a:spcAft>
         <a:buClr>
           <a:schemeClr val="accent1"/>
@@ -7392,13 +7353,13 @@
           <a:ea typeface="+mn-ea"/>
           <a:cs typeface="+mn-cs"/>
         </a:defRPr>
-      </a:lvl3pPr>
-      <a:lvl4pPr marL="1543050" indent="-171450" algn="l" defTabSz="457200" rtl="0" eaLnBrk="1" latinLnBrk="0" hangingPunct="1">
+      </a:lvl1pPr>
+      <a:lvl2pPr marL="557213" indent="-214313" algn="l" defTabSz="342900" rtl="0" eaLnBrk="1" latinLnBrk="0" hangingPunct="1">
         <a:spcBef>
           <a:spcPct val="20000"/>
         </a:spcBef>
         <a:spcAft>
-          <a:spcPts val="600"/>
+          <a:spcPts val="450"/>
         </a:spcAft>
         <a:buClr>
           <a:schemeClr val="accent1"/>
@@ -7406,7 +7367,59 @@
         <a:buSzPct val="115000"/>
         <a:buFont typeface="Arial"/>
         <a:buChar char="•"/>
-        <a:defRPr sz="1600" kern="1200" cap="none">
+        <a:defRPr sz="1500" kern="1200" cap="none">
+          <a:solidFill>
+            <a:schemeClr val="tx1">
+              <a:lumMod val="85000"/>
+              <a:lumOff val="15000"/>
+            </a:schemeClr>
+          </a:solidFill>
+          <a:effectLst/>
+          <a:latin typeface="+mn-lt"/>
+          <a:ea typeface="+mn-ea"/>
+          <a:cs typeface="+mn-cs"/>
+        </a:defRPr>
+      </a:lvl2pPr>
+      <a:lvl3pPr marL="900113" indent="-214313" algn="l" defTabSz="342900" rtl="0" eaLnBrk="1" latinLnBrk="0" hangingPunct="1">
+        <a:spcBef>
+          <a:spcPct val="20000"/>
+        </a:spcBef>
+        <a:spcAft>
+          <a:spcPts val="450"/>
+        </a:spcAft>
+        <a:buClr>
+          <a:schemeClr val="accent1"/>
+        </a:buClr>
+        <a:buSzPct val="115000"/>
+        <a:buFont typeface="Arial"/>
+        <a:buChar char="•"/>
+        <a:defRPr sz="1350" kern="1200" cap="none">
+          <a:solidFill>
+            <a:schemeClr val="tx1">
+              <a:lumMod val="85000"/>
+              <a:lumOff val="15000"/>
+            </a:schemeClr>
+          </a:solidFill>
+          <a:effectLst/>
+          <a:latin typeface="+mn-lt"/>
+          <a:ea typeface="+mn-ea"/>
+          <a:cs typeface="+mn-cs"/>
+        </a:defRPr>
+      </a:lvl3pPr>
+      <a:lvl4pPr marL="1157288" indent="-128588" algn="l" defTabSz="342900" rtl="0" eaLnBrk="1" latinLnBrk="0" hangingPunct="1">
+        <a:spcBef>
+          <a:spcPct val="20000"/>
+        </a:spcBef>
+        <a:spcAft>
+          <a:spcPts val="450"/>
+        </a:spcAft>
+        <a:buClr>
+          <a:schemeClr val="accent1"/>
+        </a:buClr>
+        <a:buSzPct val="115000"/>
+        <a:buFont typeface="Arial"/>
+        <a:buChar char="•"/>
+        <a:defRPr sz="1200" kern="1200" cap="none">
           <a:solidFill>
             <a:schemeClr val="tx1">
               <a:lumMod val="85000"/>
@@ -7419,12 +7432,12 @@
           <a:cs typeface="+mn-cs"/>
         </a:defRPr>
       </a:lvl4pPr>
-      <a:lvl5pPr marL="2000250" indent="-171450" algn="l" defTabSz="457200" rtl="0" eaLnBrk="1" latinLnBrk="0" hangingPunct="1">
+      <a:lvl5pPr marL="1500188" indent="-128588" algn="l" defTabSz="342900" rtl="0" eaLnBrk="1" latinLnBrk="0" hangingPunct="1">
         <a:spcBef>
           <a:spcPct val="20000"/>
         </a:spcBef>
         <a:spcAft>
-          <a:spcPts val="600"/>
+          <a:spcPts val="450"/>
         </a:spcAft>
         <a:buClr>
           <a:schemeClr val="accent1"/>
@@ -7432,7 +7445,7 @@
         <a:buSzPct val="115000"/>
         <a:buFont typeface="Arial"/>
         <a:buChar char="•"/>
-        <a:defRPr sz="1400" kern="1200" cap="none">
+        <a:defRPr sz="1050" kern="1200" cap="none">
           <a:solidFill>
             <a:schemeClr val="tx1">
               <a:lumMod val="85000"/>
@@ -7445,12 +7458,12 @@
           <a:cs typeface="+mn-cs"/>
         </a:defRPr>
       </a:lvl5pPr>
-      <a:lvl6pPr marL="2514600" indent="-228600" algn="l" defTabSz="457200" rtl="0" eaLnBrk="1" latinLnBrk="0" hangingPunct="1">
+      <a:lvl6pPr marL="1885950" indent="-171450" algn="l" defTabSz="342900" rtl="0" eaLnBrk="1" latinLnBrk="0" hangingPunct="1">
         <a:spcBef>
           <a:spcPct val="20000"/>
         </a:spcBef>
         <a:spcAft>
-          <a:spcPts val="600"/>
+          <a:spcPts val="450"/>
         </a:spcAft>
         <a:buClr>
           <a:schemeClr val="accent1"/>
@@ -7458,7 +7471,7 @@
         <a:buSzPct val="115000"/>
         <a:buFont typeface="Arial"/>
         <a:buChar char="•"/>
-        <a:defRPr sz="1400" kern="1200" cap="none">
+        <a:defRPr sz="1050" kern="1200" cap="none">
           <a:solidFill>
             <a:schemeClr val="tx1">
               <a:lumMod val="85000"/>
@@ -7471,12 +7484,12 @@
           <a:cs typeface="+mn-cs"/>
         </a:defRPr>
       </a:lvl6pPr>
-      <a:lvl7pPr marL="2971800" indent="-228600" algn="l" defTabSz="457200" rtl="0" eaLnBrk="1" latinLnBrk="0" hangingPunct="1">
+      <a:lvl7pPr marL="2228850" indent="-171450" algn="l" defTabSz="342900" rtl="0" eaLnBrk="1" latinLnBrk="0" hangingPunct="1">
         <a:spcBef>
           <a:spcPct val="20000"/>
         </a:spcBef>
         <a:spcAft>
-          <a:spcPts val="600"/>
+          <a:spcPts val="450"/>
         </a:spcAft>
         <a:buClr>
           <a:schemeClr val="accent1"/>
@@ -7484,7 +7497,7 @@
         <a:buSzPct val="115000"/>
         <a:buFont typeface="Arial"/>
         <a:buChar char="•"/>
-        <a:defRPr sz="1400" kern="1200" cap="none">
+        <a:defRPr sz="1050" kern="1200" cap="none">
           <a:solidFill>
             <a:schemeClr val="tx1">
               <a:lumMod val="85000"/>
@@ -7497,12 +7510,12 @@
           <a:cs typeface="+mn-cs"/>
         </a:defRPr>
       </a:lvl7pPr>
-      <a:lvl8pPr marL="3429000" indent="-228600" algn="l" defTabSz="457200" rtl="0" eaLnBrk="1" latinLnBrk="0" hangingPunct="1">
+      <a:lvl8pPr marL="2571750" indent="-171450" algn="l" defTabSz="342900" rtl="0" eaLnBrk="1" latinLnBrk="0" hangingPunct="1">
         <a:spcBef>
           <a:spcPct val="20000"/>
         </a:spcBef>
         <a:spcAft>
-          <a:spcPts val="600"/>
+          <a:spcPts val="450"/>
         </a:spcAft>
         <a:buClr>
           <a:schemeClr val="accent1"/>
@@ -7510,7 +7523,7 @@
         <a:buSzPct val="115000"/>
         <a:buFont typeface="Arial"/>
         <a:buChar char="•"/>
-        <a:defRPr sz="1400" kern="1200" cap="none">
+        <a:defRPr sz="1050" kern="1200" cap="none">
           <a:solidFill>
             <a:schemeClr val="tx1">
               <a:lumMod val="85000"/>
@@ -7523,12 +7536,12 @@
           <a:cs typeface="+mn-cs"/>
         </a:defRPr>
       </a:lvl8pPr>
-      <a:lvl9pPr marL="3886200" indent="-228600" algn="l" defTabSz="457200" rtl="0" eaLnBrk="1" latinLnBrk="0" hangingPunct="1">
+      <a:lvl9pPr marL="2914650" indent="-171450" algn="l" defTabSz="342900" rtl="0" eaLnBrk="1" latinLnBrk="0" hangingPunct="1">
         <a:spcBef>
           <a:spcPct val="20000"/>
         </a:spcBef>
         <a:spcAft>
-          <a:spcPts val="600"/>
+          <a:spcPts val="450"/>
         </a:spcAft>
         <a:buClr>
           <a:schemeClr val="accent1"/>
@@ -7536,7 +7549,7 @@
         <a:buSzPct val="115000"/>
         <a:buFont typeface="Arial"/>
         <a:buChar char="•"/>
-        <a:defRPr sz="1400" kern="1200" cap="none">
+        <a:defRPr sz="1050" kern="1200" cap="none">
           <a:solidFill>
             <a:schemeClr val="tx1">
               <a:lumMod val="85000"/>
@@ -7554,8 +7567,8 @@
       <a:defPPr>
         <a:defRPr lang="en-US"/>
       </a:defPPr>
-      <a:lvl1pPr marL="0" algn="l" defTabSz="457200" rtl="0" eaLnBrk="1" latinLnBrk="0" hangingPunct="1">
-        <a:defRPr sz="1800" kern="1200">
+      <a:lvl1pPr marL="0" algn="l" defTabSz="342900" rtl="0" eaLnBrk="1" latinLnBrk="0" hangingPunct="1">
+        <a:defRPr sz="1350" kern="1200">
           <a:solidFill>
             <a:schemeClr val="tx1"/>
           </a:solidFill>
@@ -7564,8 +7577,8 @@
           <a:cs typeface="+mn-cs"/>
         </a:defRPr>
       </a:lvl1pPr>
-      <a:lvl2pPr marL="457200" algn="l" defTabSz="457200" rtl="0" eaLnBrk="1" latinLnBrk="0" hangingPunct="1">
-        <a:defRPr sz="1800" kern="1200">
+      <a:lvl2pPr marL="342900" algn="l" defTabSz="342900" rtl="0" eaLnBrk="1" latinLnBrk="0" hangingPunct="1">
+        <a:defRPr sz="1350" kern="1200">
           <a:solidFill>
             <a:schemeClr val="tx1"/>
           </a:solidFill>
@@ -7574,8 +7587,8 @@
           <a:cs typeface="+mn-cs"/>
         </a:defRPr>
       </a:lvl2pPr>
-      <a:lvl3pPr marL="914400" algn="l" defTabSz="457200" rtl="0" eaLnBrk="1" latinLnBrk="0" hangingPunct="1">
-        <a:defRPr sz="1800" kern="1200">
+      <a:lvl3pPr marL="685800" algn="l" defTabSz="342900" rtl="0" eaLnBrk="1" latinLnBrk="0" hangingPunct="1">
+        <a:defRPr sz="1350" kern="1200">
           <a:solidFill>
             <a:schemeClr val="tx1"/>
           </a:solidFill>
@@ -7584,8 +7597,8 @@
           <a:cs typeface="+mn-cs"/>
         </a:defRPr>
       </a:lvl3pPr>
-      <a:lvl4pPr marL="1371600" algn="l" defTabSz="457200" rtl="0" eaLnBrk="1" latinLnBrk="0" hangingPunct="1">
-        <a:defRPr sz="1800" kern="1200">
+      <a:lvl4pPr marL="1028700" algn="l" defTabSz="342900" rtl="0" eaLnBrk="1" latinLnBrk="0" hangingPunct="1">
+        <a:defRPr sz="1350" kern="1200">
           <a:solidFill>
             <a:schemeClr val="tx1"/>
           </a:solidFill>
@@ -7594,8 +7607,8 @@
           <a:cs typeface="+mn-cs"/>
         </a:defRPr>
       </a:lvl4pPr>
-      <a:lvl5pPr marL="1828800" algn="l" defTabSz="457200" rtl="0" eaLnBrk="1" latinLnBrk="0" hangingPunct="1">
-        <a:defRPr sz="1800" kern="1200">
+      <a:lvl5pPr marL="1371600" algn="l" defTabSz="342900" rtl="0" eaLnBrk="1" latinLnBrk="0" hangingPunct="1">
+        <a:defRPr sz="1350" kern="1200">
           <a:solidFill>
             <a:schemeClr val="tx1"/>
           </a:solidFill>
@@ -7604,8 +7617,8 @@
           <a:cs typeface="+mn-cs"/>
         </a:defRPr>
       </a:lvl5pPr>
-      <a:lvl6pPr marL="2286000" algn="l" defTabSz="457200" rtl="0" eaLnBrk="1" latinLnBrk="0" hangingPunct="1">
-        <a:defRPr sz="1800" kern="1200">
+      <a:lvl6pPr marL="1714500" algn="l" defTabSz="342900" rtl="0" eaLnBrk="1" latinLnBrk="0" hangingPunct="1">
+        <a:defRPr sz="1350" kern="1200">
           <a:solidFill>
             <a:schemeClr val="tx1"/>
           </a:solidFill>
@@ -7614,8 +7627,8 @@
           <a:cs typeface="+mn-cs"/>
         </a:defRPr>
       </a:lvl6pPr>
-      <a:lvl7pPr marL="2743200" algn="l" defTabSz="457200" rtl="0" eaLnBrk="1" latinLnBrk="0" hangingPunct="1">
-        <a:defRPr sz="1800" kern="1200">
+      <a:lvl7pPr marL="2057400" algn="l" defTabSz="342900" rtl="0" eaLnBrk="1" latinLnBrk="0" hangingPunct="1">
+        <a:defRPr sz="1350" kern="1200">
           <a:solidFill>
             <a:schemeClr val="tx1"/>
           </a:solidFill>
@@ -7624,8 +7637,8 @@
           <a:cs typeface="+mn-cs"/>
         </a:defRPr>
       </a:lvl7pPr>
-      <a:lvl8pPr marL="3200400" algn="l" defTabSz="457200" rtl="0" eaLnBrk="1" latinLnBrk="0" hangingPunct="1">
-        <a:defRPr sz="1800" kern="1200">
+      <a:lvl8pPr marL="2400300" algn="l" defTabSz="342900" rtl="0" eaLnBrk="1" latinLnBrk="0" hangingPunct="1">
+        <a:defRPr sz="1350" kern="1200">
           <a:solidFill>
             <a:schemeClr val="tx1"/>
           </a:solidFill>
@@ -7634,8 +7647,8 @@
           <a:cs typeface="+mn-cs"/>
         </a:defRPr>
       </a:lvl8pPr>
-      <a:lvl9pPr marL="3657600" algn="l" defTabSz="457200" rtl="0" eaLnBrk="1" latinLnBrk="0" hangingPunct="1">
-        <a:defRPr sz="1800" kern="1200">
+      <a:lvl9pPr marL="2743200" algn="l" defTabSz="342900" rtl="0" eaLnBrk="1" latinLnBrk="0" hangingPunct="1">
+        <a:defRPr sz="1350" kern="1200">
           <a:solidFill>
             <a:schemeClr val="tx1"/>
           </a:solidFill>
@@ -7772,7 +7785,7 @@
         <p:spPr/>
         <p:txBody>
           <a:bodyPr>
-            <a:normAutofit fontScale="85000" lnSpcReduction="20000"/>
+            <a:normAutofit fontScale="77500" lnSpcReduction="20000"/>
           </a:bodyPr>
           <a:lstStyle/>
           <a:p>
@@ -7881,8 +7894,8 @@
         </p:nvSpPr>
         <p:spPr>
           <a:xfrm>
-            <a:off x="1057122" y="1945851"/>
-            <a:ext cx="7313992" cy="3333722"/>
+            <a:off x="871538" y="1361283"/>
+            <a:ext cx="7965282" cy="3267868"/>
           </a:xfrm>
         </p:spPr>
         <p:txBody>
@@ -7891,7 +7904,7 @@
           </a:bodyPr>
           <a:lstStyle/>
           <a:p>
-            <a:endParaRPr lang="en-US" sz="2800" dirty="0"/>
+            <a:endParaRPr lang="en-US" sz="2400" dirty="0"/>
           </a:p>
           <a:p>
             <a:pPr>
@@ -7902,7 +7915,7 @@
               </a:defRPr>
             </a:pPr>
             <a:r>
-              <a:rPr sz="2800" dirty="0"/>
+              <a:rPr sz="2400" dirty="0"/>
               <a:t> DI is a design pattern that allows dependencies to be injected externally instead of being created inside a class.</a:t>
             </a:r>
           </a:p>
@@ -7915,23 +7928,23 @@
               </a:defRPr>
             </a:pPr>
             <a:r>
-              <a:rPr sz="2800" dirty="0"/>
+              <a:rPr sz="2400" dirty="0"/>
               <a:t>- It helps achieve </a:t>
             </a:r>
             <a:r>
-              <a:rPr sz="2800" b="1" dirty="0"/>
+              <a:rPr sz="2400" b="1" dirty="0"/>
               <a:t>loose coupling</a:t>
             </a:r>
             <a:r>
-              <a:rPr sz="2800" dirty="0"/>
+              <a:rPr sz="2400" dirty="0"/>
               <a:t> and improves </a:t>
             </a:r>
             <a:r>
-              <a:rPr sz="2800" b="1" dirty="0"/>
+              <a:rPr sz="2400" b="1" dirty="0"/>
               <a:t>maintainability</a:t>
             </a:r>
             <a:r>
-              <a:rPr sz="2800" dirty="0"/>
+              <a:rPr sz="2400" dirty="0"/>
               <a:t>.</a:t>
             </a:r>
           </a:p>
@@ -7944,15 +7957,15 @@
               </a:defRPr>
             </a:pPr>
             <a:r>
-              <a:rPr sz="2800" dirty="0"/>
+              <a:rPr sz="2400" dirty="0"/>
               <a:t>- Spring provides DI through </a:t>
             </a:r>
             <a:r>
-              <a:rPr sz="2800" b="1" dirty="0"/>
+              <a:rPr sz="2400" b="1" dirty="0"/>
               <a:t>constructor injection, setter injection, and field injection</a:t>
             </a:r>
             <a:r>
-              <a:rPr sz="2800" dirty="0"/>
+              <a:rPr sz="2400" dirty="0"/>
               <a:t>.</a:t>
             </a:r>
           </a:p>
@@ -7996,7 +8009,7 @@
         <p:spPr/>
         <p:txBody>
           <a:bodyPr>
-            <a:normAutofit fontScale="90000"/>
+            <a:normAutofit/>
           </a:bodyPr>
           <a:lstStyle/>
           <a:p>
@@ -8019,7 +8032,7 @@
         <p:spPr/>
         <p:txBody>
           <a:bodyPr wrap="square">
-            <a:normAutofit/>
+            <a:normAutofit lnSpcReduction="10000"/>
           </a:bodyPr>
           <a:lstStyle/>
           <a:p>
@@ -8099,7 +8112,7 @@
         <p:spPr/>
         <p:txBody>
           <a:bodyPr>
-            <a:normAutofit fontScale="90000"/>
+            <a:normAutofit/>
           </a:bodyPr>
           <a:lstStyle/>
           <a:p>
@@ -8117,7 +8130,7 @@
         </p:nvSpPr>
         <p:spPr>
           <a:xfrm>
-            <a:off x="1176865" y="2514600"/>
+            <a:off x="1176865" y="1657351"/>
             <a:ext cx="6849952" cy="3293209"/>
           </a:xfrm>
           <a:prstGeom prst="rect">
@@ -8291,7 +8304,7 @@
         <p:spPr/>
         <p:txBody>
           <a:bodyPr>
-            <a:normAutofit fontScale="90000"/>
+            <a:normAutofit/>
           </a:bodyPr>
           <a:lstStyle/>
           <a:p>
@@ -8314,7 +8327,7 @@
         </p:nvSpPr>
         <p:spPr>
           <a:xfrm>
-            <a:off x="1176866" y="2219204"/>
+            <a:off x="1176866" y="1361955"/>
             <a:ext cx="6798736" cy="3444997"/>
           </a:xfrm>
         </p:spPr>
@@ -8445,7 +8458,7 @@
         </p:nvSpPr>
         <p:spPr>
           <a:xfrm>
-            <a:off x="762000" y="2481942"/>
+            <a:off x="762000" y="1624693"/>
             <a:ext cx="7924800" cy="3693319"/>
           </a:xfrm>
           <a:prstGeom prst="rect">
@@ -8635,7 +8648,7 @@
         </p:nvSpPr>
         <p:spPr>
           <a:xfrm>
-            <a:off x="745671" y="2579915"/>
+            <a:off x="745672" y="1722666"/>
             <a:ext cx="7652657" cy="2800767"/>
           </a:xfrm>
           <a:prstGeom prst="rect">
@@ -8911,7 +8924,7 @@
         <p:spPr/>
         <p:txBody>
           <a:bodyPr>
-            <a:normAutofit fontScale="90000"/>
+            <a:normAutofit/>
           </a:bodyPr>
           <a:lstStyle/>
           <a:p>
@@ -8934,7 +8947,7 @@
         <p:spPr/>
         <p:txBody>
           <a:bodyPr wrap="square">
-            <a:normAutofit/>
+            <a:normAutofit fontScale="92500" lnSpcReduction="20000"/>
           </a:bodyPr>
           <a:lstStyle/>
           <a:p>
@@ -9126,7 +9139,7 @@
           </a:gsLst>
           <a:lin ang="5400000" scaled="0"/>
         </a:gradFill>
-        <a:blipFill rotWithShape="1">
+        <a:blipFill>
           <a:blip xmlns:r="http://schemas.openxmlformats.org/officeDocument/2006/relationships" r:embed="rId1">
             <a:duotone>
               <a:schemeClr val="phClr">
@@ -9145,19 +9158,19 @@
         </a:blipFill>
       </a:fillStyleLst>
       <a:lnStyleLst>
-        <a:ln w="9525" cap="rnd" cmpd="sng" algn="ctr">
+        <a:ln w="9525" cap="flat" cmpd="sng" algn="ctr">
           <a:solidFill>
             <a:schemeClr val="phClr"/>
           </a:solidFill>
           <a:prstDash val="solid"/>
         </a:ln>
-        <a:ln w="15875" cap="rnd" cmpd="sng" algn="ctr">
+        <a:ln w="15875" cap="flat" cmpd="sng" algn="ctr">
           <a:solidFill>
             <a:schemeClr val="phClr"/>
           </a:solidFill>
           <a:prstDash val="solid"/>
         </a:ln>
-        <a:ln w="25400" cap="rnd" cmpd="sng" algn="ctr">
+        <a:ln w="25400" cap="flat" cmpd="sng" algn="ctr">
           <a:solidFill>
             <a:schemeClr val="phClr"/>
           </a:solidFill>

</xml_diff>